<commit_message>
[master] updated lab 5
</commit_message>
<xml_diff>
--- a/lab_05-understanding_ui/lab_05-understanding_ui.pptx
+++ b/lab_05-understanding_ui/lab_05-understanding_ui.pptx
@@ -250,7 +250,7 @@
           <a:p>
             <a:fld id="{81C4B3FE-0320-8142-8396-5C3025C019EC}" type="datetimeFigureOut">
               <a:rPr lang="en-IT" smtClean="0"/>
-              <a:t>22/03/23</a:t>
+              <a:t>2/6/24</a:t>
             </a:fld>
             <a:endParaRPr lang="en-IT"/>
           </a:p>
@@ -4587,7 +4587,7 @@
             </a:pPr>
             <a:r>
               <a:rPr lang="it-IT" sz="2800" dirty="0"/>
-              <a:t>A.Y. 2022-2023</a:t>
+              <a:t>A.Y. 2023-2024</a:t>
             </a:r>
           </a:p>
         </p:txBody>
@@ -19396,42 +19396,6 @@
           </a:p>
         </p:txBody>
       </p:sp>
-      <p:pic>
-        <p:nvPicPr>
-          <p:cNvPr id="5" name="Picture 4" descr="Graphical user interface&#10;&#10;Description automatically generated">
-            <a:extLst>
-              <a:ext uri="{FF2B5EF4-FFF2-40B4-BE49-F238E27FC236}">
-                <a16:creationId xmlns:a16="http://schemas.microsoft.com/office/drawing/2014/main" id="{0512C927-E63A-9F49-911B-ECF7BA4FFA8B}"/>
-              </a:ext>
-            </a:extLst>
-          </p:cNvPr>
-          <p:cNvPicPr>
-            <a:picLocks noChangeAspect="1"/>
-          </p:cNvPicPr>
-          <p:nvPr/>
-        </p:nvPicPr>
-        <p:blipFill>
-          <a:blip r:embed="rId2">
-            <a:extLst>
-              <a:ext uri="{28A0092B-C50C-407E-A947-70E740481C1C}">
-                <a14:useLocalDpi xmlns:a14="http://schemas.microsoft.com/office/drawing/2010/main" val="0"/>
-              </a:ext>
-            </a:extLst>
-          </a:blip>
-          <a:stretch>
-            <a:fillRect/>
-          </a:stretch>
-        </p:blipFill>
-        <p:spPr>
-          <a:xfrm>
-            <a:off x="9329859" y="1130169"/>
-            <a:ext cx="2622177" cy="5674659"/>
-          </a:xfrm>
-          <a:prstGeom prst="rect">
-            <a:avLst/>
-          </a:prstGeom>
-        </p:spPr>
-      </p:pic>
       <p:sp>
         <p:nvSpPr>
           <p:cNvPr id="7" name="Rectangle 6">
@@ -20348,6 +20312,42 @@
           </a:p>
         </p:txBody>
       </p:sp>
+      <p:pic>
+        <p:nvPicPr>
+          <p:cNvPr id="6" name="Picture 5" descr="A screen shot of a phone&#10;&#10;Description automatically generated">
+            <a:extLst>
+              <a:ext uri="{FF2B5EF4-FFF2-40B4-BE49-F238E27FC236}">
+                <a16:creationId xmlns:a16="http://schemas.microsoft.com/office/drawing/2014/main" id="{962C454D-2AC2-3E40-464C-0314B2319E79}"/>
+              </a:ext>
+            </a:extLst>
+          </p:cNvPr>
+          <p:cNvPicPr>
+            <a:picLocks noChangeAspect="1"/>
+          </p:cNvPicPr>
+          <p:nvPr/>
+        </p:nvPicPr>
+        <p:blipFill>
+          <a:blip r:embed="rId2">
+            <a:extLst>
+              <a:ext uri="{28A0092B-C50C-407E-A947-70E740481C1C}">
+                <a14:useLocalDpi xmlns:a14="http://schemas.microsoft.com/office/drawing/2010/main" val="0"/>
+              </a:ext>
+            </a:extLst>
+          </a:blip>
+          <a:stretch>
+            <a:fillRect/>
+          </a:stretch>
+        </p:blipFill>
+        <p:spPr>
+          <a:xfrm>
+            <a:off x="8824927" y="1224642"/>
+            <a:ext cx="2536093" cy="5496833"/>
+          </a:xfrm>
+          <a:prstGeom prst="rect">
+            <a:avLst/>
+          </a:prstGeom>
+        </p:spPr>
+      </p:pic>
     </p:spTree>
     <p:extLst>
       <p:ext uri="{BB962C8B-B14F-4D97-AF65-F5344CB8AC3E}">
@@ -21995,12 +21995,41 @@
           </a:p>
         </p:txBody>
       </p:sp>
+      <p:sp>
+        <p:nvSpPr>
+          <p:cNvPr id="3" name="Slide Number Placeholder 2">
+            <a:extLst>
+              <a:ext uri="{FF2B5EF4-FFF2-40B4-BE49-F238E27FC236}">
+                <a16:creationId xmlns:a16="http://schemas.microsoft.com/office/drawing/2014/main" id="{56A7BBFF-E1DF-FF4C-A98D-BE9F516BF07F}"/>
+              </a:ext>
+            </a:extLst>
+          </p:cNvPr>
+          <p:cNvSpPr>
+            <a:spLocks noGrp="1"/>
+          </p:cNvSpPr>
+          <p:nvPr>
+            <p:ph type="sldNum" sz="quarter" idx="12"/>
+          </p:nvPr>
+        </p:nvSpPr>
+        <p:spPr/>
+        <p:txBody>
+          <a:bodyPr/>
+          <a:lstStyle/>
+          <a:p>
+            <a:fld id="{31DE2C5B-556E-47B8-A792-024C2FCA4ACC}" type="slidenum">
+              <a:rPr lang="en-GB" smtClean="0"/>
+              <a:t>31</a:t>
+            </a:fld>
+            <a:endParaRPr lang="en-GB"/>
+          </a:p>
+        </p:txBody>
+      </p:sp>
       <p:pic>
         <p:nvPicPr>
-          <p:cNvPr id="9" name="Picture 8" descr="A picture containing text&#10;&#10;Description automatically generated">
+          <p:cNvPr id="8" name="Picture 7" descr="A white background with black text&#10;&#10;Description automatically generated">
             <a:extLst>
               <a:ext uri="{FF2B5EF4-FFF2-40B4-BE49-F238E27FC236}">
-                <a16:creationId xmlns:a16="http://schemas.microsoft.com/office/drawing/2014/main" id="{9220FB6C-61D0-C34A-866A-B10B32D10789}"/>
+                <a16:creationId xmlns:a16="http://schemas.microsoft.com/office/drawing/2014/main" id="{AA131723-E7EE-881F-328A-58891A618E94}"/>
               </a:ext>
             </a:extLst>
           </p:cNvPr>
@@ -22023,8 +22052,8 @@
         </p:blipFill>
         <p:spPr>
           <a:xfrm>
-            <a:off x="9287663" y="1118442"/>
-            <a:ext cx="2508823" cy="5429351"/>
+            <a:off x="6413033" y="1118442"/>
+            <a:ext cx="2508823" cy="5437727"/>
           </a:xfrm>
           <a:prstGeom prst="rect">
             <a:avLst/>
@@ -22033,10 +22062,10 @@
       </p:pic>
       <p:pic>
         <p:nvPicPr>
-          <p:cNvPr id="24" name="Picture 23" descr="Chart&#10;&#10;Description automatically generated">
+          <p:cNvPr id="11" name="Picture 10" descr="A white and grey rectangular object&#10;&#10;Description automatically generated">
             <a:extLst>
               <a:ext uri="{FF2B5EF4-FFF2-40B4-BE49-F238E27FC236}">
-                <a16:creationId xmlns:a16="http://schemas.microsoft.com/office/drawing/2014/main" id="{C418B3FB-C124-8F42-9C9A-0F91B6DCBC80}"/>
+                <a16:creationId xmlns:a16="http://schemas.microsoft.com/office/drawing/2014/main" id="{1D2BFFB6-8E4C-3691-9AE1-0E811C38D000}"/>
               </a:ext>
             </a:extLst>
           </p:cNvPr>
@@ -22059,43 +22088,14 @@
         </p:blipFill>
         <p:spPr>
           <a:xfrm>
-            <a:off x="6650921" y="1118441"/>
-            <a:ext cx="2508824" cy="5429351"/>
+            <a:off x="9104759" y="1118442"/>
+            <a:ext cx="2508823" cy="5437728"/>
           </a:xfrm>
           <a:prstGeom prst="rect">
             <a:avLst/>
           </a:prstGeom>
         </p:spPr>
       </p:pic>
-      <p:sp>
-        <p:nvSpPr>
-          <p:cNvPr id="3" name="Slide Number Placeholder 2">
-            <a:extLst>
-              <a:ext uri="{FF2B5EF4-FFF2-40B4-BE49-F238E27FC236}">
-                <a16:creationId xmlns:a16="http://schemas.microsoft.com/office/drawing/2014/main" id="{56A7BBFF-E1DF-FF4C-A98D-BE9F516BF07F}"/>
-              </a:ext>
-            </a:extLst>
-          </p:cNvPr>
-          <p:cNvSpPr>
-            <a:spLocks noGrp="1"/>
-          </p:cNvSpPr>
-          <p:nvPr>
-            <p:ph type="sldNum" sz="quarter" idx="12"/>
-          </p:nvPr>
-        </p:nvSpPr>
-        <p:spPr/>
-        <p:txBody>
-          <a:bodyPr/>
-          <a:lstStyle/>
-          <a:p>
-            <a:fld id="{31DE2C5B-556E-47B8-A792-024C2FCA4ACC}" type="slidenum">
-              <a:rPr lang="en-GB" smtClean="0"/>
-              <a:t>31</a:t>
-            </a:fld>
-            <a:endParaRPr lang="en-GB"/>
-          </a:p>
-        </p:txBody>
-      </p:sp>
     </p:spTree>
     <p:extLst>
       <p:ext uri="{BB962C8B-B14F-4D97-AF65-F5344CB8AC3E}">
@@ -22126,6 +22126,78 @@
           <a:chExt cx="0" cy="0"/>
         </a:xfrm>
       </p:grpSpPr>
+      <p:pic>
+        <p:nvPicPr>
+          <p:cNvPr id="5" name="Picture 4" descr="A white background with black text&#10;&#10;Description automatically generated">
+            <a:extLst>
+              <a:ext uri="{FF2B5EF4-FFF2-40B4-BE49-F238E27FC236}">
+                <a16:creationId xmlns:a16="http://schemas.microsoft.com/office/drawing/2014/main" id="{874DF3DB-0833-C67A-DC58-415BCBDC463A}"/>
+              </a:ext>
+            </a:extLst>
+          </p:cNvPr>
+          <p:cNvPicPr>
+            <a:picLocks noChangeAspect="1"/>
+          </p:cNvPicPr>
+          <p:nvPr/>
+        </p:nvPicPr>
+        <p:blipFill>
+          <a:blip r:embed="rId3">
+            <a:extLst>
+              <a:ext uri="{28A0092B-C50C-407E-A947-70E740481C1C}">
+                <a14:useLocalDpi xmlns:a14="http://schemas.microsoft.com/office/drawing/2010/main" val="0"/>
+              </a:ext>
+            </a:extLst>
+          </a:blip>
+          <a:stretch>
+            <a:fillRect/>
+          </a:stretch>
+        </p:blipFill>
+        <p:spPr>
+          <a:xfrm>
+            <a:off x="6413033" y="1118442"/>
+            <a:ext cx="2508823" cy="5437727"/>
+          </a:xfrm>
+          <a:prstGeom prst="rect">
+            <a:avLst/>
+          </a:prstGeom>
+        </p:spPr>
+      </p:pic>
+      <p:pic>
+        <p:nvPicPr>
+          <p:cNvPr id="6" name="Picture 5" descr="A white and grey rectangular object&#10;&#10;Description automatically generated">
+            <a:extLst>
+              <a:ext uri="{FF2B5EF4-FFF2-40B4-BE49-F238E27FC236}">
+                <a16:creationId xmlns:a16="http://schemas.microsoft.com/office/drawing/2014/main" id="{50D85150-A221-5A5A-A5AD-79B545E8E62F}"/>
+              </a:ext>
+            </a:extLst>
+          </p:cNvPr>
+          <p:cNvPicPr>
+            <a:picLocks noChangeAspect="1"/>
+          </p:cNvPicPr>
+          <p:nvPr/>
+        </p:nvPicPr>
+        <p:blipFill>
+          <a:blip r:embed="rId4">
+            <a:extLst>
+              <a:ext uri="{28A0092B-C50C-407E-A947-70E740481C1C}">
+                <a14:useLocalDpi xmlns:a14="http://schemas.microsoft.com/office/drawing/2010/main" val="0"/>
+              </a:ext>
+            </a:extLst>
+          </a:blip>
+          <a:stretch>
+            <a:fillRect/>
+          </a:stretch>
+        </p:blipFill>
+        <p:spPr>
+          <a:xfrm>
+            <a:off x="9104759" y="1118442"/>
+            <a:ext cx="2508823" cy="5437728"/>
+          </a:xfrm>
+          <a:prstGeom prst="rect">
+            <a:avLst/>
+          </a:prstGeom>
+        </p:spPr>
+      </p:pic>
       <p:sp>
         <p:nvSpPr>
           <p:cNvPr id="2" name="Title 1">
@@ -22867,78 +22939,6 @@
           </a:p>
         </p:txBody>
       </p:sp>
-      <p:pic>
-        <p:nvPicPr>
-          <p:cNvPr id="9" name="Picture 8" descr="A picture containing text&#10;&#10;Description automatically generated">
-            <a:extLst>
-              <a:ext uri="{FF2B5EF4-FFF2-40B4-BE49-F238E27FC236}">
-                <a16:creationId xmlns:a16="http://schemas.microsoft.com/office/drawing/2014/main" id="{9220FB6C-61D0-C34A-866A-B10B32D10789}"/>
-              </a:ext>
-            </a:extLst>
-          </p:cNvPr>
-          <p:cNvPicPr>
-            <a:picLocks noChangeAspect="1"/>
-          </p:cNvPicPr>
-          <p:nvPr/>
-        </p:nvPicPr>
-        <p:blipFill>
-          <a:blip r:embed="rId3">
-            <a:extLst>
-              <a:ext uri="{28A0092B-C50C-407E-A947-70E740481C1C}">
-                <a14:useLocalDpi xmlns:a14="http://schemas.microsoft.com/office/drawing/2010/main" val="0"/>
-              </a:ext>
-            </a:extLst>
-          </a:blip>
-          <a:stretch>
-            <a:fillRect/>
-          </a:stretch>
-        </p:blipFill>
-        <p:spPr>
-          <a:xfrm>
-            <a:off x="9287663" y="1118442"/>
-            <a:ext cx="2508823" cy="5429351"/>
-          </a:xfrm>
-          <a:prstGeom prst="rect">
-            <a:avLst/>
-          </a:prstGeom>
-        </p:spPr>
-      </p:pic>
-      <p:pic>
-        <p:nvPicPr>
-          <p:cNvPr id="12" name="Picture 11" descr="Chart&#10;&#10;Description automatically generated">
-            <a:extLst>
-              <a:ext uri="{FF2B5EF4-FFF2-40B4-BE49-F238E27FC236}">
-                <a16:creationId xmlns:a16="http://schemas.microsoft.com/office/drawing/2014/main" id="{76E5122A-82F6-1440-BDCE-C2939CFD9F28}"/>
-              </a:ext>
-            </a:extLst>
-          </p:cNvPr>
-          <p:cNvPicPr>
-            <a:picLocks noChangeAspect="1"/>
-          </p:cNvPicPr>
-          <p:nvPr/>
-        </p:nvPicPr>
-        <p:blipFill>
-          <a:blip r:embed="rId4">
-            <a:extLst>
-              <a:ext uri="{28A0092B-C50C-407E-A947-70E740481C1C}">
-                <a14:useLocalDpi xmlns:a14="http://schemas.microsoft.com/office/drawing/2010/main" val="0"/>
-              </a:ext>
-            </a:extLst>
-          </a:blip>
-          <a:stretch>
-            <a:fillRect/>
-          </a:stretch>
-        </p:blipFill>
-        <p:spPr>
-          <a:xfrm>
-            <a:off x="6650921" y="1118441"/>
-            <a:ext cx="2508824" cy="5429351"/>
-          </a:xfrm>
-          <a:prstGeom prst="rect">
-            <a:avLst/>
-          </a:prstGeom>
-        </p:spPr>
-      </p:pic>
       <p:sp>
         <p:nvSpPr>
           <p:cNvPr id="13" name="Rectangle 12">
@@ -22953,8 +22953,8 @@
         </p:nvSpPr>
         <p:spPr>
           <a:xfrm>
-            <a:off x="6969210" y="1435326"/>
-            <a:ext cx="2190535" cy="457200"/>
+            <a:off x="6724290" y="1421606"/>
+            <a:ext cx="2289018" cy="457200"/>
           </a:xfrm>
           <a:prstGeom prst="rect">
             <a:avLst/>
@@ -23001,8 +23001,8 @@
         </p:nvCxnSpPr>
         <p:spPr>
           <a:xfrm flipV="1">
-            <a:off x="2681416" y="1746479"/>
-            <a:ext cx="4460789" cy="996721"/>
+            <a:off x="2681416" y="1878806"/>
+            <a:ext cx="3951423" cy="864394"/>
           </a:xfrm>
           <a:prstGeom prst="straightConnector1">
             <a:avLst/>
@@ -23116,42 +23116,6 @@
           </a:p>
         </p:txBody>
       </p:sp>
-      <p:pic>
-        <p:nvPicPr>
-          <p:cNvPr id="9" name="Picture 8" descr="A picture containing text&#10;&#10;Description automatically generated">
-            <a:extLst>
-              <a:ext uri="{FF2B5EF4-FFF2-40B4-BE49-F238E27FC236}">
-                <a16:creationId xmlns:a16="http://schemas.microsoft.com/office/drawing/2014/main" id="{9220FB6C-61D0-C34A-866A-B10B32D10789}"/>
-              </a:ext>
-            </a:extLst>
-          </p:cNvPr>
-          <p:cNvPicPr>
-            <a:picLocks noChangeAspect="1"/>
-          </p:cNvPicPr>
-          <p:nvPr/>
-        </p:nvPicPr>
-        <p:blipFill>
-          <a:blip r:embed="rId3">
-            <a:extLst>
-              <a:ext uri="{28A0092B-C50C-407E-A947-70E740481C1C}">
-                <a14:useLocalDpi xmlns:a14="http://schemas.microsoft.com/office/drawing/2010/main" val="0"/>
-              </a:ext>
-            </a:extLst>
-          </a:blip>
-          <a:stretch>
-            <a:fillRect/>
-          </a:stretch>
-        </p:blipFill>
-        <p:spPr>
-          <a:xfrm>
-            <a:off x="9287663" y="1118442"/>
-            <a:ext cx="2508823" cy="5429351"/>
-          </a:xfrm>
-          <a:prstGeom prst="rect">
-            <a:avLst/>
-          </a:prstGeom>
-        </p:spPr>
-      </p:pic>
       <p:sp>
         <p:nvSpPr>
           <p:cNvPr id="3" name="Rectangle 2">
@@ -23231,19 +23195,27 @@
               <a:rPr lang="en-GB" dirty="0">
                 <a:latin typeface="Courier" pitchFamily="2" charset="0"/>
               </a:rPr>
-              <a:t>    actions: </a:t>
+              <a:t>    actions: [</a:t>
+            </a:r>
+          </a:p>
+          <a:p>
+            <a:r>
+              <a:rPr lang="en-GB" dirty="0">
+                <a:latin typeface="Courier" pitchFamily="2" charset="0"/>
+              </a:rPr>
+              <a:t>      Icon(</a:t>
             </a:r>
             <a:r>
               <a:rPr lang="en-GB" dirty="0" err="1">
                 <a:latin typeface="Courier" pitchFamily="2" charset="0"/>
               </a:rPr>
-              <a:t>const</a:t>
-            </a:r>
-            <a:r>
-              <a:rPr lang="en-GB" dirty="0">
-                <a:latin typeface="Courier" pitchFamily="2" charset="0"/>
-              </a:rPr>
-              <a:t> [</a:t>
+              <a:t>Icons.done</a:t>
+            </a:r>
+            <a:r>
+              <a:rPr lang="en-GB" dirty="0">
+                <a:latin typeface="Courier" pitchFamily="2" charset="0"/>
+              </a:rPr>
+              <a:t>,),</a:t>
             </a:r>
           </a:p>
           <a:p>
@@ -23257,26 +23229,6 @@
               <a:rPr lang="en-GB" dirty="0" err="1">
                 <a:latin typeface="Courier" pitchFamily="2" charset="0"/>
               </a:rPr>
-              <a:t>Icons.done</a:t>
-            </a:r>
-            <a:r>
-              <a:rPr lang="en-GB" dirty="0">
-                <a:latin typeface="Courier" pitchFamily="2" charset="0"/>
-              </a:rPr>
-              <a:t>,),</a:t>
-            </a:r>
-          </a:p>
-          <a:p>
-            <a:r>
-              <a:rPr lang="en-GB" dirty="0">
-                <a:latin typeface="Courier" pitchFamily="2" charset="0"/>
-              </a:rPr>
-              <a:t>      Icon(</a:t>
-            </a:r>
-            <a:r>
-              <a:rPr lang="en-GB" dirty="0" err="1">
-                <a:latin typeface="Courier" pitchFamily="2" charset="0"/>
-              </a:rPr>
               <a:t>Icons.error</a:t>
             </a:r>
             <a:r>
@@ -23299,19 +23251,7 @@
               <a:rPr lang="en-GB" dirty="0">
                 <a:latin typeface="Courier" pitchFamily="2" charset="0"/>
               </a:rPr>
-              <a:t>    title: </a:t>
-            </a:r>
-            <a:r>
-              <a:rPr lang="en-GB" dirty="0" err="1">
-                <a:latin typeface="Courier" pitchFamily="2" charset="0"/>
-              </a:rPr>
-              <a:t>const</a:t>
-            </a:r>
-            <a:r>
-              <a:rPr lang="en-GB" dirty="0">
-                <a:latin typeface="Courier" pitchFamily="2" charset="0"/>
-              </a:rPr>
-              <a:t> Text('The </a:t>
+              <a:t>    title: Text('The </a:t>
             </a:r>
             <a:r>
               <a:rPr lang="en-GB" dirty="0" err="1">
@@ -23345,12 +23285,77 @@
           </a:p>
         </p:txBody>
       </p:sp>
+      <p:sp>
+        <p:nvSpPr>
+          <p:cNvPr id="4" name="Slide Number Placeholder 3">
+            <a:extLst>
+              <a:ext uri="{FF2B5EF4-FFF2-40B4-BE49-F238E27FC236}">
+                <a16:creationId xmlns:a16="http://schemas.microsoft.com/office/drawing/2014/main" id="{298DD69C-546C-5243-B1BF-03AA1A22829B}"/>
+              </a:ext>
+            </a:extLst>
+          </p:cNvPr>
+          <p:cNvSpPr>
+            <a:spLocks noGrp="1"/>
+          </p:cNvSpPr>
+          <p:nvPr>
+            <p:ph type="sldNum" sz="quarter" idx="12"/>
+          </p:nvPr>
+        </p:nvSpPr>
+        <p:spPr/>
+        <p:txBody>
+          <a:bodyPr/>
+          <a:lstStyle/>
+          <a:p>
+            <a:fld id="{31DE2C5B-556E-47B8-A792-024C2FCA4ACC}" type="slidenum">
+              <a:rPr lang="en-GB" smtClean="0"/>
+              <a:t>33</a:t>
+            </a:fld>
+            <a:endParaRPr lang="en-GB"/>
+          </a:p>
+        </p:txBody>
+      </p:sp>
       <p:pic>
         <p:nvPicPr>
-          <p:cNvPr id="8" name="Picture 7" descr="Chart&#10;&#10;Description automatically generated">
+          <p:cNvPr id="5" name="Picture 4" descr="A white background with black text&#10;&#10;Description automatically generated">
             <a:extLst>
               <a:ext uri="{FF2B5EF4-FFF2-40B4-BE49-F238E27FC236}">
-                <a16:creationId xmlns:a16="http://schemas.microsoft.com/office/drawing/2014/main" id="{5DB3F566-12DC-BA4B-9881-6CA17528B105}"/>
+                <a16:creationId xmlns:a16="http://schemas.microsoft.com/office/drawing/2014/main" id="{D24E13AF-06FC-C063-9A5D-7C76A0EBD279}"/>
+              </a:ext>
+            </a:extLst>
+          </p:cNvPr>
+          <p:cNvPicPr>
+            <a:picLocks noChangeAspect="1"/>
+          </p:cNvPicPr>
+          <p:nvPr/>
+        </p:nvPicPr>
+        <p:blipFill>
+          <a:blip r:embed="rId3">
+            <a:extLst>
+              <a:ext uri="{28A0092B-C50C-407E-A947-70E740481C1C}">
+                <a14:useLocalDpi xmlns:a14="http://schemas.microsoft.com/office/drawing/2010/main" val="0"/>
+              </a:ext>
+            </a:extLst>
+          </a:blip>
+          <a:stretch>
+            <a:fillRect/>
+          </a:stretch>
+        </p:blipFill>
+        <p:spPr>
+          <a:xfrm>
+            <a:off x="6413033" y="1118442"/>
+            <a:ext cx="2508823" cy="5437727"/>
+          </a:xfrm>
+          <a:prstGeom prst="rect">
+            <a:avLst/>
+          </a:prstGeom>
+        </p:spPr>
+      </p:pic>
+      <p:pic>
+        <p:nvPicPr>
+          <p:cNvPr id="6" name="Picture 5" descr="A white and grey rectangular object&#10;&#10;Description automatically generated">
+            <a:extLst>
+              <a:ext uri="{FF2B5EF4-FFF2-40B4-BE49-F238E27FC236}">
+                <a16:creationId xmlns:a16="http://schemas.microsoft.com/office/drawing/2014/main" id="{DB89B3B6-3749-2536-F24B-6449CED0A7F8}"/>
               </a:ext>
             </a:extLst>
           </p:cNvPr>
@@ -23373,8 +23378,8 @@
         </p:blipFill>
         <p:spPr>
           <a:xfrm>
-            <a:off x="6406823" y="1118442"/>
-            <a:ext cx="2508824" cy="5429351"/>
+            <a:off x="9104759" y="1118442"/>
+            <a:ext cx="2508823" cy="5437728"/>
           </a:xfrm>
           <a:prstGeom prst="rect">
             <a:avLst/>
@@ -23383,10 +23388,10 @@
       </p:pic>
       <p:sp>
         <p:nvSpPr>
-          <p:cNvPr id="11" name="Rectangle 10">
+          <p:cNvPr id="7" name="Rectangle 6">
             <a:extLst>
               <a:ext uri="{FF2B5EF4-FFF2-40B4-BE49-F238E27FC236}">
-                <a16:creationId xmlns:a16="http://schemas.microsoft.com/office/drawing/2014/main" id="{3074FE6D-6A1C-4C42-8BDF-DAE641A85946}"/>
+                <a16:creationId xmlns:a16="http://schemas.microsoft.com/office/drawing/2014/main" id="{00C7B54F-A59B-B23B-9905-61D8A0FFCA4C}"/>
               </a:ext>
             </a:extLst>
           </p:cNvPr>
@@ -23395,8 +23400,8 @@
         </p:nvSpPr>
         <p:spPr>
           <a:xfrm>
-            <a:off x="6725112" y="1365122"/>
-            <a:ext cx="2190535" cy="457200"/>
+            <a:off x="6724290" y="1421606"/>
+            <a:ext cx="2289018" cy="457200"/>
           </a:xfrm>
           <a:prstGeom prst="rect">
             <a:avLst/>
@@ -23424,35 +23429,6 @@
           <a:p>
             <a:pPr algn="ctr"/>
             <a:endParaRPr lang="en-IT"/>
-          </a:p>
-        </p:txBody>
-      </p:sp>
-      <p:sp>
-        <p:nvSpPr>
-          <p:cNvPr id="4" name="Slide Number Placeholder 3">
-            <a:extLst>
-              <a:ext uri="{FF2B5EF4-FFF2-40B4-BE49-F238E27FC236}">
-                <a16:creationId xmlns:a16="http://schemas.microsoft.com/office/drawing/2014/main" id="{298DD69C-546C-5243-B1BF-03AA1A22829B}"/>
-              </a:ext>
-            </a:extLst>
-          </p:cNvPr>
-          <p:cNvSpPr>
-            <a:spLocks noGrp="1"/>
-          </p:cNvSpPr>
-          <p:nvPr>
-            <p:ph type="sldNum" sz="quarter" idx="12"/>
-          </p:nvPr>
-        </p:nvSpPr>
-        <p:spPr/>
-        <p:txBody>
-          <a:bodyPr/>
-          <a:lstStyle/>
-          <a:p>
-            <a:fld id="{31DE2C5B-556E-47B8-A792-024C2FCA4ACC}" type="slidenum">
-              <a:rPr lang="en-GB" smtClean="0"/>
-              <a:t>33</a:t>
-            </a:fld>
-            <a:endParaRPr lang="en-GB"/>
           </a:p>
         </p:txBody>
       </p:sp>
@@ -23486,6 +23462,78 @@
           <a:chExt cx="0" cy="0"/>
         </a:xfrm>
       </p:grpSpPr>
+      <p:pic>
+        <p:nvPicPr>
+          <p:cNvPr id="5" name="Picture 4" descr="A white background with black text&#10;&#10;Description automatically generated">
+            <a:extLst>
+              <a:ext uri="{FF2B5EF4-FFF2-40B4-BE49-F238E27FC236}">
+                <a16:creationId xmlns:a16="http://schemas.microsoft.com/office/drawing/2014/main" id="{AC18A4C4-8495-EFA8-B0A3-DECD5B039960}"/>
+              </a:ext>
+            </a:extLst>
+          </p:cNvPr>
+          <p:cNvPicPr>
+            <a:picLocks noChangeAspect="1"/>
+          </p:cNvPicPr>
+          <p:nvPr/>
+        </p:nvPicPr>
+        <p:blipFill>
+          <a:blip r:embed="rId3">
+            <a:extLst>
+              <a:ext uri="{28A0092B-C50C-407E-A947-70E740481C1C}">
+                <a14:useLocalDpi xmlns:a14="http://schemas.microsoft.com/office/drawing/2010/main" val="0"/>
+              </a:ext>
+            </a:extLst>
+          </a:blip>
+          <a:stretch>
+            <a:fillRect/>
+          </a:stretch>
+        </p:blipFill>
+        <p:spPr>
+          <a:xfrm>
+            <a:off x="6413033" y="1118442"/>
+            <a:ext cx="2508823" cy="5437727"/>
+          </a:xfrm>
+          <a:prstGeom prst="rect">
+            <a:avLst/>
+          </a:prstGeom>
+        </p:spPr>
+      </p:pic>
+      <p:pic>
+        <p:nvPicPr>
+          <p:cNvPr id="6" name="Picture 5" descr="A white and grey rectangular object&#10;&#10;Description automatically generated">
+            <a:extLst>
+              <a:ext uri="{FF2B5EF4-FFF2-40B4-BE49-F238E27FC236}">
+                <a16:creationId xmlns:a16="http://schemas.microsoft.com/office/drawing/2014/main" id="{8361A059-30CE-E8DC-F518-AC183944A708}"/>
+              </a:ext>
+            </a:extLst>
+          </p:cNvPr>
+          <p:cNvPicPr>
+            <a:picLocks noChangeAspect="1"/>
+          </p:cNvPicPr>
+          <p:nvPr/>
+        </p:nvPicPr>
+        <p:blipFill>
+          <a:blip r:embed="rId4">
+            <a:extLst>
+              <a:ext uri="{28A0092B-C50C-407E-A947-70E740481C1C}">
+                <a14:useLocalDpi xmlns:a14="http://schemas.microsoft.com/office/drawing/2010/main" val="0"/>
+              </a:ext>
+            </a:extLst>
+          </a:blip>
+          <a:stretch>
+            <a:fillRect/>
+          </a:stretch>
+        </p:blipFill>
+        <p:spPr>
+          <a:xfrm>
+            <a:off x="9104759" y="1118442"/>
+            <a:ext cx="2508823" cy="5437728"/>
+          </a:xfrm>
+          <a:prstGeom prst="rect">
+            <a:avLst/>
+          </a:prstGeom>
+        </p:spPr>
+      </p:pic>
       <p:sp>
         <p:nvSpPr>
           <p:cNvPr id="2" name="Title 1">
@@ -24227,78 +24275,6 @@
           </a:p>
         </p:txBody>
       </p:sp>
-      <p:pic>
-        <p:nvPicPr>
-          <p:cNvPr id="9" name="Picture 8" descr="A picture containing text&#10;&#10;Description automatically generated">
-            <a:extLst>
-              <a:ext uri="{FF2B5EF4-FFF2-40B4-BE49-F238E27FC236}">
-                <a16:creationId xmlns:a16="http://schemas.microsoft.com/office/drawing/2014/main" id="{9220FB6C-61D0-C34A-866A-B10B32D10789}"/>
-              </a:ext>
-            </a:extLst>
-          </p:cNvPr>
-          <p:cNvPicPr>
-            <a:picLocks noChangeAspect="1"/>
-          </p:cNvPicPr>
-          <p:nvPr/>
-        </p:nvPicPr>
-        <p:blipFill>
-          <a:blip r:embed="rId3">
-            <a:extLst>
-              <a:ext uri="{28A0092B-C50C-407E-A947-70E740481C1C}">
-                <a14:useLocalDpi xmlns:a14="http://schemas.microsoft.com/office/drawing/2010/main" val="0"/>
-              </a:ext>
-            </a:extLst>
-          </a:blip>
-          <a:stretch>
-            <a:fillRect/>
-          </a:stretch>
-        </p:blipFill>
-        <p:spPr>
-          <a:xfrm>
-            <a:off x="9287663" y="1118442"/>
-            <a:ext cx="2508823" cy="5429351"/>
-          </a:xfrm>
-          <a:prstGeom prst="rect">
-            <a:avLst/>
-          </a:prstGeom>
-        </p:spPr>
-      </p:pic>
-      <p:pic>
-        <p:nvPicPr>
-          <p:cNvPr id="13" name="Picture 12" descr="Chart&#10;&#10;Description automatically generated">
-            <a:extLst>
-              <a:ext uri="{FF2B5EF4-FFF2-40B4-BE49-F238E27FC236}">
-                <a16:creationId xmlns:a16="http://schemas.microsoft.com/office/drawing/2014/main" id="{83619BA0-B74F-0942-9EB7-993B35BA9C8F}"/>
-              </a:ext>
-            </a:extLst>
-          </p:cNvPr>
-          <p:cNvPicPr>
-            <a:picLocks noChangeAspect="1"/>
-          </p:cNvPicPr>
-          <p:nvPr/>
-        </p:nvPicPr>
-        <p:blipFill>
-          <a:blip r:embed="rId4">
-            <a:extLst>
-              <a:ext uri="{28A0092B-C50C-407E-A947-70E740481C1C}">
-                <a14:useLocalDpi xmlns:a14="http://schemas.microsoft.com/office/drawing/2010/main" val="0"/>
-              </a:ext>
-            </a:extLst>
-          </a:blip>
-          <a:stretch>
-            <a:fillRect/>
-          </a:stretch>
-        </p:blipFill>
-        <p:spPr>
-          <a:xfrm>
-            <a:off x="6406823" y="1118442"/>
-            <a:ext cx="2508824" cy="5429351"/>
-          </a:xfrm>
-          <a:prstGeom prst="rect">
-            <a:avLst/>
-          </a:prstGeom>
-        </p:spPr>
-      </p:pic>
       <p:cxnSp>
         <p:nvCxnSpPr>
           <p:cNvPr id="15" name="Straight Arrow Connector 14">
@@ -24492,40 +24468,12 @@
           <a:chExt cx="0" cy="0"/>
         </a:xfrm>
       </p:grpSpPr>
-      <p:sp>
-        <p:nvSpPr>
-          <p:cNvPr id="2" name="Title 1">
-            <a:extLst>
-              <a:ext uri="{FF2B5EF4-FFF2-40B4-BE49-F238E27FC236}">
-                <a16:creationId xmlns:a16="http://schemas.microsoft.com/office/drawing/2014/main" id="{122C1E14-0610-FB4E-BCD3-3BA8CADF9D02}"/>
-              </a:ext>
-            </a:extLst>
-          </p:cNvPr>
-          <p:cNvSpPr>
-            <a:spLocks noGrp="1"/>
-          </p:cNvSpPr>
-          <p:nvPr>
-            <p:ph type="title"/>
-          </p:nvPr>
-        </p:nvSpPr>
-        <p:spPr/>
-        <p:txBody>
-          <a:bodyPr/>
-          <a:lstStyle/>
-          <a:p>
-            <a:r>
-              <a:rPr lang="en-IT" dirty="0"/>
-              <a:t>Focus on the Scaffold</a:t>
-            </a:r>
-          </a:p>
-        </p:txBody>
-      </p:sp>
       <p:pic>
         <p:nvPicPr>
-          <p:cNvPr id="9" name="Picture 8" descr="A picture containing text&#10;&#10;Description automatically generated">
+          <p:cNvPr id="5" name="Picture 4" descr="A white background with black text&#10;&#10;Description automatically generated">
             <a:extLst>
               <a:ext uri="{FF2B5EF4-FFF2-40B4-BE49-F238E27FC236}">
-                <a16:creationId xmlns:a16="http://schemas.microsoft.com/office/drawing/2014/main" id="{9220FB6C-61D0-C34A-866A-B10B32D10789}"/>
+                <a16:creationId xmlns:a16="http://schemas.microsoft.com/office/drawing/2014/main" id="{6CDE04DB-9FD7-2116-C4D5-3ED1C5D2287F}"/>
               </a:ext>
             </a:extLst>
           </p:cNvPr>
@@ -24548,14 +24496,78 @@
         </p:blipFill>
         <p:spPr>
           <a:xfrm>
-            <a:off x="9287663" y="1118442"/>
-            <a:ext cx="2508823" cy="5429351"/>
+            <a:off x="6413033" y="1118442"/>
+            <a:ext cx="2508823" cy="5437727"/>
           </a:xfrm>
           <a:prstGeom prst="rect">
             <a:avLst/>
           </a:prstGeom>
         </p:spPr>
       </p:pic>
+      <p:pic>
+        <p:nvPicPr>
+          <p:cNvPr id="6" name="Picture 5" descr="A white and grey rectangular object&#10;&#10;Description automatically generated">
+            <a:extLst>
+              <a:ext uri="{FF2B5EF4-FFF2-40B4-BE49-F238E27FC236}">
+                <a16:creationId xmlns:a16="http://schemas.microsoft.com/office/drawing/2014/main" id="{A9623EE3-C8A7-9C38-397B-D8257BE2DEEB}"/>
+              </a:ext>
+            </a:extLst>
+          </p:cNvPr>
+          <p:cNvPicPr>
+            <a:picLocks noChangeAspect="1"/>
+          </p:cNvPicPr>
+          <p:nvPr/>
+        </p:nvPicPr>
+        <p:blipFill>
+          <a:blip r:embed="rId4">
+            <a:extLst>
+              <a:ext uri="{28A0092B-C50C-407E-A947-70E740481C1C}">
+                <a14:useLocalDpi xmlns:a14="http://schemas.microsoft.com/office/drawing/2010/main" val="0"/>
+              </a:ext>
+            </a:extLst>
+          </a:blip>
+          <a:stretch>
+            <a:fillRect/>
+          </a:stretch>
+        </p:blipFill>
+        <p:spPr>
+          <a:xfrm>
+            <a:off x="9104759" y="1118442"/>
+            <a:ext cx="2508823" cy="5437728"/>
+          </a:xfrm>
+          <a:prstGeom prst="rect">
+            <a:avLst/>
+          </a:prstGeom>
+        </p:spPr>
+      </p:pic>
+      <p:sp>
+        <p:nvSpPr>
+          <p:cNvPr id="2" name="Title 1">
+            <a:extLst>
+              <a:ext uri="{FF2B5EF4-FFF2-40B4-BE49-F238E27FC236}">
+                <a16:creationId xmlns:a16="http://schemas.microsoft.com/office/drawing/2014/main" id="{122C1E14-0610-FB4E-BCD3-3BA8CADF9D02}"/>
+              </a:ext>
+            </a:extLst>
+          </p:cNvPr>
+          <p:cNvSpPr>
+            <a:spLocks noGrp="1"/>
+          </p:cNvSpPr>
+          <p:nvPr>
+            <p:ph type="title"/>
+          </p:nvPr>
+        </p:nvSpPr>
+        <p:spPr/>
+        <p:txBody>
+          <a:bodyPr/>
+          <a:lstStyle/>
+          <a:p>
+            <a:r>
+              <a:rPr lang="en-IT" dirty="0"/>
+              <a:t>Focus on the Scaffold</a:t>
+            </a:r>
+          </a:p>
+        </p:txBody>
+      </p:sp>
       <p:sp>
         <p:nvSpPr>
           <p:cNvPr id="3" name="Rectangle 2">
@@ -24659,19 +24671,7 @@
               <a:rPr lang="en-GB" dirty="0">
                 <a:latin typeface="Courier" pitchFamily="2" charset="0"/>
               </a:rPr>
-              <a:t>      children: </a:t>
-            </a:r>
-            <a:r>
-              <a:rPr lang="en-GB" dirty="0" err="1">
-                <a:latin typeface="Courier" pitchFamily="2" charset="0"/>
-              </a:rPr>
-              <a:t>const</a:t>
-            </a:r>
-            <a:r>
-              <a:rPr lang="en-GB" dirty="0">
-                <a:latin typeface="Courier" pitchFamily="2" charset="0"/>
-              </a:rPr>
-              <a:t> [</a:t>
+              <a:t>      children: [</a:t>
             </a:r>
           </a:p>
           <a:p>
@@ -24725,42 +24725,6 @@
           </a:p>
         </p:txBody>
       </p:sp>
-      <p:pic>
-        <p:nvPicPr>
-          <p:cNvPr id="8" name="Picture 7" descr="Chart&#10;&#10;Description automatically generated">
-            <a:extLst>
-              <a:ext uri="{FF2B5EF4-FFF2-40B4-BE49-F238E27FC236}">
-                <a16:creationId xmlns:a16="http://schemas.microsoft.com/office/drawing/2014/main" id="{5DB3F566-12DC-BA4B-9881-6CA17528B105}"/>
-              </a:ext>
-            </a:extLst>
-          </p:cNvPr>
-          <p:cNvPicPr>
-            <a:picLocks noChangeAspect="1"/>
-          </p:cNvPicPr>
-          <p:nvPr/>
-        </p:nvPicPr>
-        <p:blipFill>
-          <a:blip r:embed="rId4">
-            <a:extLst>
-              <a:ext uri="{28A0092B-C50C-407E-A947-70E740481C1C}">
-                <a14:useLocalDpi xmlns:a14="http://schemas.microsoft.com/office/drawing/2010/main" val="0"/>
-              </a:ext>
-            </a:extLst>
-          </a:blip>
-          <a:stretch>
-            <a:fillRect/>
-          </a:stretch>
-        </p:blipFill>
-        <p:spPr>
-          <a:xfrm>
-            <a:off x="6406823" y="1118442"/>
-            <a:ext cx="2508824" cy="5429351"/>
-          </a:xfrm>
-          <a:prstGeom prst="rect">
-            <a:avLst/>
-          </a:prstGeom>
-        </p:spPr>
-      </p:pic>
       <p:sp>
         <p:nvSpPr>
           <p:cNvPr id="7" name="Rectangle 6">
@@ -24866,6 +24830,78 @@
           <a:chExt cx="0" cy="0"/>
         </a:xfrm>
       </p:grpSpPr>
+      <p:pic>
+        <p:nvPicPr>
+          <p:cNvPr id="5" name="Picture 4" descr="A white background with black text&#10;&#10;Description automatically generated">
+            <a:extLst>
+              <a:ext uri="{FF2B5EF4-FFF2-40B4-BE49-F238E27FC236}">
+                <a16:creationId xmlns:a16="http://schemas.microsoft.com/office/drawing/2014/main" id="{53E9DD9D-8373-C3B2-A068-87F349703CEE}"/>
+              </a:ext>
+            </a:extLst>
+          </p:cNvPr>
+          <p:cNvPicPr>
+            <a:picLocks noChangeAspect="1"/>
+          </p:cNvPicPr>
+          <p:nvPr/>
+        </p:nvPicPr>
+        <p:blipFill>
+          <a:blip r:embed="rId3">
+            <a:extLst>
+              <a:ext uri="{28A0092B-C50C-407E-A947-70E740481C1C}">
+                <a14:useLocalDpi xmlns:a14="http://schemas.microsoft.com/office/drawing/2010/main" val="0"/>
+              </a:ext>
+            </a:extLst>
+          </a:blip>
+          <a:stretch>
+            <a:fillRect/>
+          </a:stretch>
+        </p:blipFill>
+        <p:spPr>
+          <a:xfrm>
+            <a:off x="6413033" y="1118442"/>
+            <a:ext cx="2508823" cy="5437727"/>
+          </a:xfrm>
+          <a:prstGeom prst="rect">
+            <a:avLst/>
+          </a:prstGeom>
+        </p:spPr>
+      </p:pic>
+      <p:pic>
+        <p:nvPicPr>
+          <p:cNvPr id="6" name="Picture 5" descr="A white and grey rectangular object&#10;&#10;Description automatically generated">
+            <a:extLst>
+              <a:ext uri="{FF2B5EF4-FFF2-40B4-BE49-F238E27FC236}">
+                <a16:creationId xmlns:a16="http://schemas.microsoft.com/office/drawing/2014/main" id="{2CA31F3E-4581-8171-397F-BE9F9F36AC1F}"/>
+              </a:ext>
+            </a:extLst>
+          </p:cNvPr>
+          <p:cNvPicPr>
+            <a:picLocks noChangeAspect="1"/>
+          </p:cNvPicPr>
+          <p:nvPr/>
+        </p:nvPicPr>
+        <p:blipFill>
+          <a:blip r:embed="rId4">
+            <a:extLst>
+              <a:ext uri="{28A0092B-C50C-407E-A947-70E740481C1C}">
+                <a14:useLocalDpi xmlns:a14="http://schemas.microsoft.com/office/drawing/2010/main" val="0"/>
+              </a:ext>
+            </a:extLst>
+          </a:blip>
+          <a:stretch>
+            <a:fillRect/>
+          </a:stretch>
+        </p:blipFill>
+        <p:spPr>
+          <a:xfrm>
+            <a:off x="9104759" y="1118442"/>
+            <a:ext cx="2508823" cy="5437728"/>
+          </a:xfrm>
+          <a:prstGeom prst="rect">
+            <a:avLst/>
+          </a:prstGeom>
+        </p:spPr>
+      </p:pic>
       <p:sp>
         <p:nvSpPr>
           <p:cNvPr id="2" name="Title 1">
@@ -25607,78 +25643,6 @@
           </a:p>
         </p:txBody>
       </p:sp>
-      <p:pic>
-        <p:nvPicPr>
-          <p:cNvPr id="9" name="Picture 8" descr="A picture containing text&#10;&#10;Description automatically generated">
-            <a:extLst>
-              <a:ext uri="{FF2B5EF4-FFF2-40B4-BE49-F238E27FC236}">
-                <a16:creationId xmlns:a16="http://schemas.microsoft.com/office/drawing/2014/main" id="{9220FB6C-61D0-C34A-866A-B10B32D10789}"/>
-              </a:ext>
-            </a:extLst>
-          </p:cNvPr>
-          <p:cNvPicPr>
-            <a:picLocks noChangeAspect="1"/>
-          </p:cNvPicPr>
-          <p:nvPr/>
-        </p:nvPicPr>
-        <p:blipFill>
-          <a:blip r:embed="rId3">
-            <a:extLst>
-              <a:ext uri="{28A0092B-C50C-407E-A947-70E740481C1C}">
-                <a14:useLocalDpi xmlns:a14="http://schemas.microsoft.com/office/drawing/2010/main" val="0"/>
-              </a:ext>
-            </a:extLst>
-          </a:blip>
-          <a:stretch>
-            <a:fillRect/>
-          </a:stretch>
-        </p:blipFill>
-        <p:spPr>
-          <a:xfrm>
-            <a:off x="9287663" y="1118442"/>
-            <a:ext cx="2508823" cy="5429351"/>
-          </a:xfrm>
-          <a:prstGeom prst="rect">
-            <a:avLst/>
-          </a:prstGeom>
-        </p:spPr>
-      </p:pic>
-      <p:pic>
-        <p:nvPicPr>
-          <p:cNvPr id="13" name="Picture 12" descr="Chart&#10;&#10;Description automatically generated">
-            <a:extLst>
-              <a:ext uri="{FF2B5EF4-FFF2-40B4-BE49-F238E27FC236}">
-                <a16:creationId xmlns:a16="http://schemas.microsoft.com/office/drawing/2014/main" id="{83619BA0-B74F-0942-9EB7-993B35BA9C8F}"/>
-              </a:ext>
-            </a:extLst>
-          </p:cNvPr>
-          <p:cNvPicPr>
-            <a:picLocks noChangeAspect="1"/>
-          </p:cNvPicPr>
-          <p:nvPr/>
-        </p:nvPicPr>
-        <p:blipFill>
-          <a:blip r:embed="rId4">
-            <a:extLst>
-              <a:ext uri="{28A0092B-C50C-407E-A947-70E740481C1C}">
-                <a14:useLocalDpi xmlns:a14="http://schemas.microsoft.com/office/drawing/2010/main" val="0"/>
-              </a:ext>
-            </a:extLst>
-          </a:blip>
-          <a:stretch>
-            <a:fillRect/>
-          </a:stretch>
-        </p:blipFill>
-        <p:spPr>
-          <a:xfrm>
-            <a:off x="6406823" y="1118442"/>
-            <a:ext cx="2508824" cy="5429351"/>
-          </a:xfrm>
-          <a:prstGeom prst="rect">
-            <a:avLst/>
-          </a:prstGeom>
-        </p:spPr>
-      </p:pic>
       <p:sp>
         <p:nvSpPr>
           <p:cNvPr id="14" name="Rectangle 13">
@@ -25828,40 +25792,12 @@
           <a:chExt cx="0" cy="0"/>
         </a:xfrm>
       </p:grpSpPr>
-      <p:sp>
-        <p:nvSpPr>
-          <p:cNvPr id="2" name="Title 1">
-            <a:extLst>
-              <a:ext uri="{FF2B5EF4-FFF2-40B4-BE49-F238E27FC236}">
-                <a16:creationId xmlns:a16="http://schemas.microsoft.com/office/drawing/2014/main" id="{122C1E14-0610-FB4E-BCD3-3BA8CADF9D02}"/>
-              </a:ext>
-            </a:extLst>
-          </p:cNvPr>
-          <p:cNvSpPr>
-            <a:spLocks noGrp="1"/>
-          </p:cNvSpPr>
-          <p:nvPr>
-            <p:ph type="title"/>
-          </p:nvPr>
-        </p:nvSpPr>
-        <p:spPr/>
-        <p:txBody>
-          <a:bodyPr/>
-          <a:lstStyle/>
-          <a:p>
-            <a:r>
-              <a:rPr lang="en-IT" dirty="0"/>
-              <a:t>Focus on the Scaffold</a:t>
-            </a:r>
-          </a:p>
-        </p:txBody>
-      </p:sp>
       <p:pic>
         <p:nvPicPr>
-          <p:cNvPr id="9" name="Picture 8" descr="A picture containing text&#10;&#10;Description automatically generated">
+          <p:cNvPr id="4" name="Picture 3" descr="A white background with black text&#10;&#10;Description automatically generated">
             <a:extLst>
               <a:ext uri="{FF2B5EF4-FFF2-40B4-BE49-F238E27FC236}">
-                <a16:creationId xmlns:a16="http://schemas.microsoft.com/office/drawing/2014/main" id="{9220FB6C-61D0-C34A-866A-B10B32D10789}"/>
+                <a16:creationId xmlns:a16="http://schemas.microsoft.com/office/drawing/2014/main" id="{E6A6DB3A-D9CE-AB2C-C1CC-4CA44BDA0750}"/>
               </a:ext>
             </a:extLst>
           </p:cNvPr>
@@ -25884,8 +25820,8 @@
         </p:blipFill>
         <p:spPr>
           <a:xfrm>
-            <a:off x="9287663" y="1118442"/>
-            <a:ext cx="2508823" cy="5429351"/>
+            <a:off x="6413033" y="1118442"/>
+            <a:ext cx="2508823" cy="5437727"/>
           </a:xfrm>
           <a:prstGeom prst="rect">
             <a:avLst/>
@@ -25894,10 +25830,10 @@
       </p:pic>
       <p:pic>
         <p:nvPicPr>
-          <p:cNvPr id="13" name="Picture 12" descr="Chart&#10;&#10;Description automatically generated">
+          <p:cNvPr id="5" name="Picture 4" descr="A white and grey rectangular object&#10;&#10;Description automatically generated">
             <a:extLst>
               <a:ext uri="{FF2B5EF4-FFF2-40B4-BE49-F238E27FC236}">
-                <a16:creationId xmlns:a16="http://schemas.microsoft.com/office/drawing/2014/main" id="{83619BA0-B74F-0942-9EB7-993B35BA9C8F}"/>
+                <a16:creationId xmlns:a16="http://schemas.microsoft.com/office/drawing/2014/main" id="{831972C0-3C05-2074-2961-26DC095204A4}"/>
               </a:ext>
             </a:extLst>
           </p:cNvPr>
@@ -25920,14 +25856,42 @@
         </p:blipFill>
         <p:spPr>
           <a:xfrm>
-            <a:off x="6406823" y="1118442"/>
-            <a:ext cx="2508824" cy="5429351"/>
+            <a:off x="9104759" y="1118442"/>
+            <a:ext cx="2508823" cy="5437728"/>
           </a:xfrm>
           <a:prstGeom prst="rect">
             <a:avLst/>
           </a:prstGeom>
         </p:spPr>
       </p:pic>
+      <p:sp>
+        <p:nvSpPr>
+          <p:cNvPr id="2" name="Title 1">
+            <a:extLst>
+              <a:ext uri="{FF2B5EF4-FFF2-40B4-BE49-F238E27FC236}">
+                <a16:creationId xmlns:a16="http://schemas.microsoft.com/office/drawing/2014/main" id="{122C1E14-0610-FB4E-BCD3-3BA8CADF9D02}"/>
+              </a:ext>
+            </a:extLst>
+          </p:cNvPr>
+          <p:cNvSpPr>
+            <a:spLocks noGrp="1"/>
+          </p:cNvSpPr>
+          <p:nvPr>
+            <p:ph type="title"/>
+          </p:nvPr>
+        </p:nvSpPr>
+        <p:spPr/>
+        <p:txBody>
+          <a:bodyPr/>
+          <a:lstStyle/>
+          <a:p>
+            <a:r>
+              <a:rPr lang="en-IT" dirty="0"/>
+              <a:t>Focus on the Scaffold</a:t>
+            </a:r>
+          </a:p>
+        </p:txBody>
+      </p:sp>
       <p:sp>
         <p:nvSpPr>
           <p:cNvPr id="14" name="Rectangle 13">
@@ -26030,18 +25994,6 @@
                 <a:latin typeface="Courier" pitchFamily="2" charset="0"/>
               </a:rPr>
               <a:t>  body: </a:t>
-            </a:r>
-            <a:r>
-              <a:rPr lang="en-GB" dirty="0" err="1">
-                <a:latin typeface="Courier" pitchFamily="2" charset="0"/>
-              </a:rPr>
-              <a:t>const</a:t>
-            </a:r>
-            <a:r>
-              <a:rPr lang="en-GB" dirty="0">
-                <a:latin typeface="Courier" pitchFamily="2" charset="0"/>
-              </a:rPr>
-              <a:t> </a:t>
             </a:r>
             <a:r>
               <a:rPr lang="en-GB" dirty="0" err="1">
@@ -26142,6 +26094,78 @@
           <a:chExt cx="0" cy="0"/>
         </a:xfrm>
       </p:grpSpPr>
+      <p:pic>
+        <p:nvPicPr>
+          <p:cNvPr id="5" name="Picture 4" descr="A white background with black text&#10;&#10;Description automatically generated">
+            <a:extLst>
+              <a:ext uri="{FF2B5EF4-FFF2-40B4-BE49-F238E27FC236}">
+                <a16:creationId xmlns:a16="http://schemas.microsoft.com/office/drawing/2014/main" id="{F47A1ED6-7BBD-319A-D7BD-06A647ED78D5}"/>
+              </a:ext>
+            </a:extLst>
+          </p:cNvPr>
+          <p:cNvPicPr>
+            <a:picLocks noChangeAspect="1"/>
+          </p:cNvPicPr>
+          <p:nvPr/>
+        </p:nvPicPr>
+        <p:blipFill>
+          <a:blip r:embed="rId3">
+            <a:extLst>
+              <a:ext uri="{28A0092B-C50C-407E-A947-70E740481C1C}">
+                <a14:useLocalDpi xmlns:a14="http://schemas.microsoft.com/office/drawing/2010/main" val="0"/>
+              </a:ext>
+            </a:extLst>
+          </a:blip>
+          <a:stretch>
+            <a:fillRect/>
+          </a:stretch>
+        </p:blipFill>
+        <p:spPr>
+          <a:xfrm>
+            <a:off x="6413033" y="1118442"/>
+            <a:ext cx="2508823" cy="5437727"/>
+          </a:xfrm>
+          <a:prstGeom prst="rect">
+            <a:avLst/>
+          </a:prstGeom>
+        </p:spPr>
+      </p:pic>
+      <p:pic>
+        <p:nvPicPr>
+          <p:cNvPr id="6" name="Picture 5" descr="A white and grey rectangular object&#10;&#10;Description automatically generated">
+            <a:extLst>
+              <a:ext uri="{FF2B5EF4-FFF2-40B4-BE49-F238E27FC236}">
+                <a16:creationId xmlns:a16="http://schemas.microsoft.com/office/drawing/2014/main" id="{E02FA73D-D28E-2A58-D4BF-0AF944B135D6}"/>
+              </a:ext>
+            </a:extLst>
+          </p:cNvPr>
+          <p:cNvPicPr>
+            <a:picLocks noChangeAspect="1"/>
+          </p:cNvPicPr>
+          <p:nvPr/>
+        </p:nvPicPr>
+        <p:blipFill>
+          <a:blip r:embed="rId4">
+            <a:extLst>
+              <a:ext uri="{28A0092B-C50C-407E-A947-70E740481C1C}">
+                <a14:useLocalDpi xmlns:a14="http://schemas.microsoft.com/office/drawing/2010/main" val="0"/>
+              </a:ext>
+            </a:extLst>
+          </a:blip>
+          <a:stretch>
+            <a:fillRect/>
+          </a:stretch>
+        </p:blipFill>
+        <p:spPr>
+          <a:xfrm>
+            <a:off x="9104759" y="1118442"/>
+            <a:ext cx="2508823" cy="5437728"/>
+          </a:xfrm>
+          <a:prstGeom prst="rect">
+            <a:avLst/>
+          </a:prstGeom>
+        </p:spPr>
+      </p:pic>
       <p:sp>
         <p:nvSpPr>
           <p:cNvPr id="2" name="Title 1">
@@ -26883,78 +26907,6 @@
           </a:p>
         </p:txBody>
       </p:sp>
-      <p:pic>
-        <p:nvPicPr>
-          <p:cNvPr id="9" name="Picture 8" descr="A picture containing text&#10;&#10;Description automatically generated">
-            <a:extLst>
-              <a:ext uri="{FF2B5EF4-FFF2-40B4-BE49-F238E27FC236}">
-                <a16:creationId xmlns:a16="http://schemas.microsoft.com/office/drawing/2014/main" id="{9220FB6C-61D0-C34A-866A-B10B32D10789}"/>
-              </a:ext>
-            </a:extLst>
-          </p:cNvPr>
-          <p:cNvPicPr>
-            <a:picLocks noChangeAspect="1"/>
-          </p:cNvPicPr>
-          <p:nvPr/>
-        </p:nvPicPr>
-        <p:blipFill>
-          <a:blip r:embed="rId3">
-            <a:extLst>
-              <a:ext uri="{28A0092B-C50C-407E-A947-70E740481C1C}">
-                <a14:useLocalDpi xmlns:a14="http://schemas.microsoft.com/office/drawing/2010/main" val="0"/>
-              </a:ext>
-            </a:extLst>
-          </a:blip>
-          <a:stretch>
-            <a:fillRect/>
-          </a:stretch>
-        </p:blipFill>
-        <p:spPr>
-          <a:xfrm>
-            <a:off x="9287663" y="1118442"/>
-            <a:ext cx="2508823" cy="5429351"/>
-          </a:xfrm>
-          <a:prstGeom prst="rect">
-            <a:avLst/>
-          </a:prstGeom>
-        </p:spPr>
-      </p:pic>
-      <p:pic>
-        <p:nvPicPr>
-          <p:cNvPr id="13" name="Picture 12" descr="Chart&#10;&#10;Description automatically generated">
-            <a:extLst>
-              <a:ext uri="{FF2B5EF4-FFF2-40B4-BE49-F238E27FC236}">
-                <a16:creationId xmlns:a16="http://schemas.microsoft.com/office/drawing/2014/main" id="{83619BA0-B74F-0942-9EB7-993B35BA9C8F}"/>
-              </a:ext>
-            </a:extLst>
-          </p:cNvPr>
-          <p:cNvPicPr>
-            <a:picLocks noChangeAspect="1"/>
-          </p:cNvPicPr>
-          <p:nvPr/>
-        </p:nvPicPr>
-        <p:blipFill>
-          <a:blip r:embed="rId4">
-            <a:extLst>
-              <a:ext uri="{28A0092B-C50C-407E-A947-70E740481C1C}">
-                <a14:useLocalDpi xmlns:a14="http://schemas.microsoft.com/office/drawing/2010/main" val="0"/>
-              </a:ext>
-            </a:extLst>
-          </a:blip>
-          <a:stretch>
-            <a:fillRect/>
-          </a:stretch>
-        </p:blipFill>
-        <p:spPr>
-          <a:xfrm>
-            <a:off x="6406823" y="1118442"/>
-            <a:ext cx="2508824" cy="5429351"/>
-          </a:xfrm>
-          <a:prstGeom prst="rect">
-            <a:avLst/>
-          </a:prstGeom>
-        </p:spPr>
-      </p:pic>
       <p:cxnSp>
         <p:nvCxnSpPr>
           <p:cNvPr id="15" name="Straight Arrow Connector 14">
@@ -27104,40 +27056,12 @@
           <a:chExt cx="0" cy="0"/>
         </a:xfrm>
       </p:grpSpPr>
-      <p:sp>
-        <p:nvSpPr>
-          <p:cNvPr id="2" name="Title 1">
-            <a:extLst>
-              <a:ext uri="{FF2B5EF4-FFF2-40B4-BE49-F238E27FC236}">
-                <a16:creationId xmlns:a16="http://schemas.microsoft.com/office/drawing/2014/main" id="{122C1E14-0610-FB4E-BCD3-3BA8CADF9D02}"/>
-              </a:ext>
-            </a:extLst>
-          </p:cNvPr>
-          <p:cNvSpPr>
-            <a:spLocks noGrp="1"/>
-          </p:cNvSpPr>
-          <p:nvPr>
-            <p:ph type="title"/>
-          </p:nvPr>
-        </p:nvSpPr>
-        <p:spPr/>
-        <p:txBody>
-          <a:bodyPr/>
-          <a:lstStyle/>
-          <a:p>
-            <a:r>
-              <a:rPr lang="en-IT" dirty="0"/>
-              <a:t>Focus on the Scaffold</a:t>
-            </a:r>
-          </a:p>
-        </p:txBody>
-      </p:sp>
       <p:pic>
         <p:nvPicPr>
-          <p:cNvPr id="9" name="Picture 8" descr="A picture containing text&#10;&#10;Description automatically generated">
+          <p:cNvPr id="5" name="Picture 4" descr="A white background with black text&#10;&#10;Description automatically generated">
             <a:extLst>
               <a:ext uri="{FF2B5EF4-FFF2-40B4-BE49-F238E27FC236}">
-                <a16:creationId xmlns:a16="http://schemas.microsoft.com/office/drawing/2014/main" id="{9220FB6C-61D0-C34A-866A-B10B32D10789}"/>
+                <a16:creationId xmlns:a16="http://schemas.microsoft.com/office/drawing/2014/main" id="{0F43A198-1C3B-42AA-2013-003E3B642A65}"/>
               </a:ext>
             </a:extLst>
           </p:cNvPr>
@@ -27160,14 +27084,78 @@
         </p:blipFill>
         <p:spPr>
           <a:xfrm>
-            <a:off x="9287663" y="1118442"/>
-            <a:ext cx="2508823" cy="5429351"/>
+            <a:off x="6413033" y="1118442"/>
+            <a:ext cx="2508823" cy="5437727"/>
           </a:xfrm>
           <a:prstGeom prst="rect">
             <a:avLst/>
           </a:prstGeom>
         </p:spPr>
       </p:pic>
+      <p:pic>
+        <p:nvPicPr>
+          <p:cNvPr id="6" name="Picture 5" descr="A white and grey rectangular object&#10;&#10;Description automatically generated">
+            <a:extLst>
+              <a:ext uri="{FF2B5EF4-FFF2-40B4-BE49-F238E27FC236}">
+                <a16:creationId xmlns:a16="http://schemas.microsoft.com/office/drawing/2014/main" id="{DD4FB214-4C07-8DC1-6DB7-72AE5D31DEF4}"/>
+              </a:ext>
+            </a:extLst>
+          </p:cNvPr>
+          <p:cNvPicPr>
+            <a:picLocks noChangeAspect="1"/>
+          </p:cNvPicPr>
+          <p:nvPr/>
+        </p:nvPicPr>
+        <p:blipFill>
+          <a:blip r:embed="rId4">
+            <a:extLst>
+              <a:ext uri="{28A0092B-C50C-407E-A947-70E740481C1C}">
+                <a14:useLocalDpi xmlns:a14="http://schemas.microsoft.com/office/drawing/2010/main" val="0"/>
+              </a:ext>
+            </a:extLst>
+          </a:blip>
+          <a:stretch>
+            <a:fillRect/>
+          </a:stretch>
+        </p:blipFill>
+        <p:spPr>
+          <a:xfrm>
+            <a:off x="9104759" y="1118442"/>
+            <a:ext cx="2508823" cy="5437728"/>
+          </a:xfrm>
+          <a:prstGeom prst="rect">
+            <a:avLst/>
+          </a:prstGeom>
+        </p:spPr>
+      </p:pic>
+      <p:sp>
+        <p:nvSpPr>
+          <p:cNvPr id="2" name="Title 1">
+            <a:extLst>
+              <a:ext uri="{FF2B5EF4-FFF2-40B4-BE49-F238E27FC236}">
+                <a16:creationId xmlns:a16="http://schemas.microsoft.com/office/drawing/2014/main" id="{122C1E14-0610-FB4E-BCD3-3BA8CADF9D02}"/>
+              </a:ext>
+            </a:extLst>
+          </p:cNvPr>
+          <p:cNvSpPr>
+            <a:spLocks noGrp="1"/>
+          </p:cNvSpPr>
+          <p:nvPr>
+            <p:ph type="title"/>
+          </p:nvPr>
+        </p:nvSpPr>
+        <p:spPr/>
+        <p:txBody>
+          <a:bodyPr/>
+          <a:lstStyle/>
+          <a:p>
+            <a:r>
+              <a:rPr lang="en-IT" dirty="0"/>
+              <a:t>Focus on the Scaffold</a:t>
+            </a:r>
+          </a:p>
+        </p:txBody>
+      </p:sp>
       <p:sp>
         <p:nvSpPr>
           <p:cNvPr id="3" name="Rectangle 2">
@@ -27263,19 +27251,7 @@
               <a:rPr lang="en-GB" dirty="0">
                 <a:latin typeface="Courier" pitchFamily="2" charset="0"/>
               </a:rPr>
-              <a:t>      child: </a:t>
-            </a:r>
-            <a:r>
-              <a:rPr lang="en-GB" dirty="0" err="1">
-                <a:latin typeface="Courier" pitchFamily="2" charset="0"/>
-              </a:rPr>
-              <a:t>const</a:t>
-            </a:r>
-            <a:r>
-              <a:rPr lang="en-GB" dirty="0">
-                <a:latin typeface="Courier" pitchFamily="2" charset="0"/>
-              </a:rPr>
-              <a:t> Icon(</a:t>
+              <a:t>      child: Icon(</a:t>
             </a:r>
             <a:r>
               <a:rPr lang="en-GB" dirty="0" err="1">
@@ -27329,42 +27305,6 @@
           </a:p>
         </p:txBody>
       </p:sp>
-      <p:pic>
-        <p:nvPicPr>
-          <p:cNvPr id="8" name="Picture 7" descr="Chart&#10;&#10;Description automatically generated">
-            <a:extLst>
-              <a:ext uri="{FF2B5EF4-FFF2-40B4-BE49-F238E27FC236}">
-                <a16:creationId xmlns:a16="http://schemas.microsoft.com/office/drawing/2014/main" id="{5DB3F566-12DC-BA4B-9881-6CA17528B105}"/>
-              </a:ext>
-            </a:extLst>
-          </p:cNvPr>
-          <p:cNvPicPr>
-            <a:picLocks noChangeAspect="1"/>
-          </p:cNvPicPr>
-          <p:nvPr/>
-        </p:nvPicPr>
-        <p:blipFill>
-          <a:blip r:embed="rId4">
-            <a:extLst>
-              <a:ext uri="{28A0092B-C50C-407E-A947-70E740481C1C}">
-                <a14:useLocalDpi xmlns:a14="http://schemas.microsoft.com/office/drawing/2010/main" val="0"/>
-              </a:ext>
-            </a:extLst>
-          </a:blip>
-          <a:stretch>
-            <a:fillRect/>
-          </a:stretch>
-        </p:blipFill>
-        <p:spPr>
-          <a:xfrm>
-            <a:off x="6406823" y="1118442"/>
-            <a:ext cx="2508824" cy="5429351"/>
-          </a:xfrm>
-          <a:prstGeom prst="rect">
-            <a:avLst/>
-          </a:prstGeom>
-        </p:spPr>
-      </p:pic>
       <p:sp>
         <p:nvSpPr>
           <p:cNvPr id="7" name="Rectangle 6">
@@ -27721,6 +27661,78 @@
           <a:chExt cx="0" cy="0"/>
         </a:xfrm>
       </p:grpSpPr>
+      <p:pic>
+        <p:nvPicPr>
+          <p:cNvPr id="5" name="Picture 4" descr="A white background with black text&#10;&#10;Description automatically generated">
+            <a:extLst>
+              <a:ext uri="{FF2B5EF4-FFF2-40B4-BE49-F238E27FC236}">
+                <a16:creationId xmlns:a16="http://schemas.microsoft.com/office/drawing/2014/main" id="{167C2462-0D14-E8ED-95B8-CB92B90BA871}"/>
+              </a:ext>
+            </a:extLst>
+          </p:cNvPr>
+          <p:cNvPicPr>
+            <a:picLocks noChangeAspect="1"/>
+          </p:cNvPicPr>
+          <p:nvPr/>
+        </p:nvPicPr>
+        <p:blipFill>
+          <a:blip r:embed="rId3">
+            <a:extLst>
+              <a:ext uri="{28A0092B-C50C-407E-A947-70E740481C1C}">
+                <a14:useLocalDpi xmlns:a14="http://schemas.microsoft.com/office/drawing/2010/main" val="0"/>
+              </a:ext>
+            </a:extLst>
+          </a:blip>
+          <a:stretch>
+            <a:fillRect/>
+          </a:stretch>
+        </p:blipFill>
+        <p:spPr>
+          <a:xfrm>
+            <a:off x="6413033" y="1118442"/>
+            <a:ext cx="2508823" cy="5437727"/>
+          </a:xfrm>
+          <a:prstGeom prst="rect">
+            <a:avLst/>
+          </a:prstGeom>
+        </p:spPr>
+      </p:pic>
+      <p:pic>
+        <p:nvPicPr>
+          <p:cNvPr id="6" name="Picture 5" descr="A white and grey rectangular object&#10;&#10;Description automatically generated">
+            <a:extLst>
+              <a:ext uri="{FF2B5EF4-FFF2-40B4-BE49-F238E27FC236}">
+                <a16:creationId xmlns:a16="http://schemas.microsoft.com/office/drawing/2014/main" id="{F39E4531-53FB-A9D0-5160-3CE0C5BA63E8}"/>
+              </a:ext>
+            </a:extLst>
+          </p:cNvPr>
+          <p:cNvPicPr>
+            <a:picLocks noChangeAspect="1"/>
+          </p:cNvPicPr>
+          <p:nvPr/>
+        </p:nvPicPr>
+        <p:blipFill>
+          <a:blip r:embed="rId4">
+            <a:extLst>
+              <a:ext uri="{28A0092B-C50C-407E-A947-70E740481C1C}">
+                <a14:useLocalDpi xmlns:a14="http://schemas.microsoft.com/office/drawing/2010/main" val="0"/>
+              </a:ext>
+            </a:extLst>
+          </a:blip>
+          <a:stretch>
+            <a:fillRect/>
+          </a:stretch>
+        </p:blipFill>
+        <p:spPr>
+          <a:xfrm>
+            <a:off x="9104759" y="1118442"/>
+            <a:ext cx="2508823" cy="5437728"/>
+          </a:xfrm>
+          <a:prstGeom prst="rect">
+            <a:avLst/>
+          </a:prstGeom>
+        </p:spPr>
+      </p:pic>
       <p:sp>
         <p:nvSpPr>
           <p:cNvPr id="2" name="Title 1">
@@ -28462,78 +28474,6 @@
           </a:p>
         </p:txBody>
       </p:sp>
-      <p:pic>
-        <p:nvPicPr>
-          <p:cNvPr id="9" name="Picture 8" descr="A picture containing text&#10;&#10;Description automatically generated">
-            <a:extLst>
-              <a:ext uri="{FF2B5EF4-FFF2-40B4-BE49-F238E27FC236}">
-                <a16:creationId xmlns:a16="http://schemas.microsoft.com/office/drawing/2014/main" id="{9220FB6C-61D0-C34A-866A-B10B32D10789}"/>
-              </a:ext>
-            </a:extLst>
-          </p:cNvPr>
-          <p:cNvPicPr>
-            <a:picLocks noChangeAspect="1"/>
-          </p:cNvPicPr>
-          <p:nvPr/>
-        </p:nvPicPr>
-        <p:blipFill>
-          <a:blip r:embed="rId3">
-            <a:extLst>
-              <a:ext uri="{28A0092B-C50C-407E-A947-70E740481C1C}">
-                <a14:useLocalDpi xmlns:a14="http://schemas.microsoft.com/office/drawing/2010/main" val="0"/>
-              </a:ext>
-            </a:extLst>
-          </a:blip>
-          <a:stretch>
-            <a:fillRect/>
-          </a:stretch>
-        </p:blipFill>
-        <p:spPr>
-          <a:xfrm>
-            <a:off x="9287663" y="1118442"/>
-            <a:ext cx="2508823" cy="5429351"/>
-          </a:xfrm>
-          <a:prstGeom prst="rect">
-            <a:avLst/>
-          </a:prstGeom>
-        </p:spPr>
-      </p:pic>
-      <p:pic>
-        <p:nvPicPr>
-          <p:cNvPr id="13" name="Picture 12" descr="Chart&#10;&#10;Description automatically generated">
-            <a:extLst>
-              <a:ext uri="{FF2B5EF4-FFF2-40B4-BE49-F238E27FC236}">
-                <a16:creationId xmlns:a16="http://schemas.microsoft.com/office/drawing/2014/main" id="{83619BA0-B74F-0942-9EB7-993B35BA9C8F}"/>
-              </a:ext>
-            </a:extLst>
-          </p:cNvPr>
-          <p:cNvPicPr>
-            <a:picLocks noChangeAspect="1"/>
-          </p:cNvPicPr>
-          <p:nvPr/>
-        </p:nvPicPr>
-        <p:blipFill>
-          <a:blip r:embed="rId4">
-            <a:extLst>
-              <a:ext uri="{28A0092B-C50C-407E-A947-70E740481C1C}">
-                <a14:useLocalDpi xmlns:a14="http://schemas.microsoft.com/office/drawing/2010/main" val="0"/>
-              </a:ext>
-            </a:extLst>
-          </a:blip>
-          <a:stretch>
-            <a:fillRect/>
-          </a:stretch>
-        </p:blipFill>
-        <p:spPr>
-          <a:xfrm>
-            <a:off x="6406823" y="1118442"/>
-            <a:ext cx="2508824" cy="5429351"/>
-          </a:xfrm>
-          <a:prstGeom prst="rect">
-            <a:avLst/>
-          </a:prstGeom>
-        </p:spPr>
-      </p:pic>
       <p:cxnSp>
         <p:nvCxnSpPr>
           <p:cNvPr id="15" name="Straight Arrow Connector 14">
@@ -28683,40 +28623,12 @@
           <a:chExt cx="0" cy="0"/>
         </a:xfrm>
       </p:grpSpPr>
-      <p:sp>
-        <p:nvSpPr>
-          <p:cNvPr id="2" name="Title 1">
-            <a:extLst>
-              <a:ext uri="{FF2B5EF4-FFF2-40B4-BE49-F238E27FC236}">
-                <a16:creationId xmlns:a16="http://schemas.microsoft.com/office/drawing/2014/main" id="{122C1E14-0610-FB4E-BCD3-3BA8CADF9D02}"/>
-              </a:ext>
-            </a:extLst>
-          </p:cNvPr>
-          <p:cNvSpPr>
-            <a:spLocks noGrp="1"/>
-          </p:cNvSpPr>
-          <p:nvPr>
-            <p:ph type="title"/>
-          </p:nvPr>
-        </p:nvSpPr>
-        <p:spPr/>
-        <p:txBody>
-          <a:bodyPr/>
-          <a:lstStyle/>
-          <a:p>
-            <a:r>
-              <a:rPr lang="en-IT" dirty="0"/>
-              <a:t>Focus on the Scaffold</a:t>
-            </a:r>
-          </a:p>
-        </p:txBody>
-      </p:sp>
       <p:pic>
         <p:nvPicPr>
-          <p:cNvPr id="9" name="Picture 8" descr="A picture containing text&#10;&#10;Description automatically generated">
+          <p:cNvPr id="5" name="Picture 4" descr="A white background with black text&#10;&#10;Description automatically generated">
             <a:extLst>
               <a:ext uri="{FF2B5EF4-FFF2-40B4-BE49-F238E27FC236}">
-                <a16:creationId xmlns:a16="http://schemas.microsoft.com/office/drawing/2014/main" id="{9220FB6C-61D0-C34A-866A-B10B32D10789}"/>
+                <a16:creationId xmlns:a16="http://schemas.microsoft.com/office/drawing/2014/main" id="{0717DD54-2808-069C-80E0-27EF8341758D}"/>
               </a:ext>
             </a:extLst>
           </p:cNvPr>
@@ -28739,14 +28651,78 @@
         </p:blipFill>
         <p:spPr>
           <a:xfrm>
-            <a:off x="9287663" y="1118442"/>
-            <a:ext cx="2508823" cy="5429351"/>
+            <a:off x="6413033" y="1118442"/>
+            <a:ext cx="2508823" cy="5437727"/>
           </a:xfrm>
           <a:prstGeom prst="rect">
             <a:avLst/>
           </a:prstGeom>
         </p:spPr>
       </p:pic>
+      <p:pic>
+        <p:nvPicPr>
+          <p:cNvPr id="10" name="Picture 9" descr="A white and grey rectangular object&#10;&#10;Description automatically generated">
+            <a:extLst>
+              <a:ext uri="{FF2B5EF4-FFF2-40B4-BE49-F238E27FC236}">
+                <a16:creationId xmlns:a16="http://schemas.microsoft.com/office/drawing/2014/main" id="{BBD699FC-DC3C-8EAA-EFBB-3CF6EA0C7626}"/>
+              </a:ext>
+            </a:extLst>
+          </p:cNvPr>
+          <p:cNvPicPr>
+            <a:picLocks noChangeAspect="1"/>
+          </p:cNvPicPr>
+          <p:nvPr/>
+        </p:nvPicPr>
+        <p:blipFill>
+          <a:blip r:embed="rId4">
+            <a:extLst>
+              <a:ext uri="{28A0092B-C50C-407E-A947-70E740481C1C}">
+                <a14:useLocalDpi xmlns:a14="http://schemas.microsoft.com/office/drawing/2010/main" val="0"/>
+              </a:ext>
+            </a:extLst>
+          </a:blip>
+          <a:stretch>
+            <a:fillRect/>
+          </a:stretch>
+        </p:blipFill>
+        <p:spPr>
+          <a:xfrm>
+            <a:off x="9104759" y="1118442"/>
+            <a:ext cx="2508823" cy="5437728"/>
+          </a:xfrm>
+          <a:prstGeom prst="rect">
+            <a:avLst/>
+          </a:prstGeom>
+        </p:spPr>
+      </p:pic>
+      <p:sp>
+        <p:nvSpPr>
+          <p:cNvPr id="2" name="Title 1">
+            <a:extLst>
+              <a:ext uri="{FF2B5EF4-FFF2-40B4-BE49-F238E27FC236}">
+                <a16:creationId xmlns:a16="http://schemas.microsoft.com/office/drawing/2014/main" id="{122C1E14-0610-FB4E-BCD3-3BA8CADF9D02}"/>
+              </a:ext>
+            </a:extLst>
+          </p:cNvPr>
+          <p:cNvSpPr>
+            <a:spLocks noGrp="1"/>
+          </p:cNvSpPr>
+          <p:nvPr>
+            <p:ph type="title"/>
+          </p:nvPr>
+        </p:nvSpPr>
+        <p:spPr/>
+        <p:txBody>
+          <a:bodyPr/>
+          <a:lstStyle/>
+          <a:p>
+            <a:r>
+              <a:rPr lang="en-IT" dirty="0"/>
+              <a:t>Focus on the Scaffold</a:t>
+            </a:r>
+          </a:p>
+        </p:txBody>
+      </p:sp>
       <p:sp>
         <p:nvSpPr>
           <p:cNvPr id="3" name="Rectangle 2">
@@ -28842,19 +28818,7 @@
               <a:rPr lang="en-GB" dirty="0">
                 <a:latin typeface="Courier" pitchFamily="2" charset="0"/>
               </a:rPr>
-              <a:t>      items: </a:t>
-            </a:r>
-            <a:r>
-              <a:rPr lang="en-GB" dirty="0" err="1">
-                <a:latin typeface="Courier" pitchFamily="2" charset="0"/>
-              </a:rPr>
-              <a:t>const</a:t>
-            </a:r>
-            <a:r>
-              <a:rPr lang="en-GB" dirty="0">
-                <a:latin typeface="Courier" pitchFamily="2" charset="0"/>
-              </a:rPr>
-              <a:t> [</a:t>
+              <a:t>      items: [</a:t>
             </a:r>
           </a:p>
           <a:p>
@@ -28999,42 +28963,6 @@
           </a:p>
         </p:txBody>
       </p:sp>
-      <p:pic>
-        <p:nvPicPr>
-          <p:cNvPr id="8" name="Picture 7" descr="Chart&#10;&#10;Description automatically generated">
-            <a:extLst>
-              <a:ext uri="{FF2B5EF4-FFF2-40B4-BE49-F238E27FC236}">
-                <a16:creationId xmlns:a16="http://schemas.microsoft.com/office/drawing/2014/main" id="{5DB3F566-12DC-BA4B-9881-6CA17528B105}"/>
-              </a:ext>
-            </a:extLst>
-          </p:cNvPr>
-          <p:cNvPicPr>
-            <a:picLocks noChangeAspect="1"/>
-          </p:cNvPicPr>
-          <p:nvPr/>
-        </p:nvPicPr>
-        <p:blipFill>
-          <a:blip r:embed="rId4">
-            <a:extLst>
-              <a:ext uri="{28A0092B-C50C-407E-A947-70E740481C1C}">
-                <a14:useLocalDpi xmlns:a14="http://schemas.microsoft.com/office/drawing/2010/main" val="0"/>
-              </a:ext>
-            </a:extLst>
-          </a:blip>
-          <a:stretch>
-            <a:fillRect/>
-          </a:stretch>
-        </p:blipFill>
-        <p:spPr>
-          <a:xfrm>
-            <a:off x="6406823" y="1118442"/>
-            <a:ext cx="2508824" cy="5429351"/>
-          </a:xfrm>
-          <a:prstGeom prst="rect">
-            <a:avLst/>
-          </a:prstGeom>
-        </p:spPr>
-      </p:pic>
       <p:sp>
         <p:nvSpPr>
           <p:cNvPr id="6" name="Rectangle 5">
@@ -29734,12 +29662,41 @@
           </a:p>
         </p:txBody>
       </p:sp>
+      <p:sp>
+        <p:nvSpPr>
+          <p:cNvPr id="4" name="Slide Number Placeholder 3">
+            <a:extLst>
+              <a:ext uri="{FF2B5EF4-FFF2-40B4-BE49-F238E27FC236}">
+                <a16:creationId xmlns:a16="http://schemas.microsoft.com/office/drawing/2014/main" id="{B6145EDD-D38F-FC48-B946-783D9F6FEDBD}"/>
+              </a:ext>
+            </a:extLst>
+          </p:cNvPr>
+          <p:cNvSpPr>
+            <a:spLocks noGrp="1"/>
+          </p:cNvSpPr>
+          <p:nvPr>
+            <p:ph type="sldNum" sz="quarter" idx="12"/>
+          </p:nvPr>
+        </p:nvSpPr>
+        <p:spPr/>
+        <p:txBody>
+          <a:bodyPr/>
+          <a:lstStyle/>
+          <a:p>
+            <a:fld id="{31DE2C5B-556E-47B8-A792-024C2FCA4ACC}" type="slidenum">
+              <a:rPr lang="en-GB" smtClean="0"/>
+              <a:t>43</a:t>
+            </a:fld>
+            <a:endParaRPr lang="en-GB"/>
+          </a:p>
+        </p:txBody>
+      </p:sp>
       <p:pic>
         <p:nvPicPr>
-          <p:cNvPr id="6" name="Picture 5" descr="A picture containing graphical user interface&#10;&#10;Description automatically generated">
+          <p:cNvPr id="7" name="Picture 6" descr="A white background with black dots&#10;&#10;Description automatically generated">
             <a:extLst>
               <a:ext uri="{FF2B5EF4-FFF2-40B4-BE49-F238E27FC236}">
-                <a16:creationId xmlns:a16="http://schemas.microsoft.com/office/drawing/2014/main" id="{B4A251A1-5250-B045-91D3-5EC162088A82}"/>
+                <a16:creationId xmlns:a16="http://schemas.microsoft.com/office/drawing/2014/main" id="{9DAF0817-A321-1C77-343E-50422EDD601A}"/>
               </a:ext>
             </a:extLst>
           </p:cNvPr>
@@ -29762,43 +29719,14 @@
         </p:blipFill>
         <p:spPr>
           <a:xfrm>
-            <a:off x="9167828" y="1219615"/>
-            <a:ext cx="2596000" cy="5618010"/>
+            <a:off x="8325122" y="1022169"/>
+            <a:ext cx="2692497" cy="5835831"/>
           </a:xfrm>
           <a:prstGeom prst="rect">
             <a:avLst/>
           </a:prstGeom>
         </p:spPr>
       </p:pic>
-      <p:sp>
-        <p:nvSpPr>
-          <p:cNvPr id="4" name="Slide Number Placeholder 3">
-            <a:extLst>
-              <a:ext uri="{FF2B5EF4-FFF2-40B4-BE49-F238E27FC236}">
-                <a16:creationId xmlns:a16="http://schemas.microsoft.com/office/drawing/2014/main" id="{B6145EDD-D38F-FC48-B946-783D9F6FEDBD}"/>
-              </a:ext>
-            </a:extLst>
-          </p:cNvPr>
-          <p:cNvSpPr>
-            <a:spLocks noGrp="1"/>
-          </p:cNvSpPr>
-          <p:nvPr>
-            <p:ph type="sldNum" sz="quarter" idx="12"/>
-          </p:nvPr>
-        </p:nvSpPr>
-        <p:spPr/>
-        <p:txBody>
-          <a:bodyPr/>
-          <a:lstStyle/>
-          <a:p>
-            <a:fld id="{31DE2C5B-556E-47B8-A792-024C2FCA4ACC}" type="slidenum">
-              <a:rPr lang="en-GB" smtClean="0"/>
-              <a:t>43</a:t>
-            </a:fld>
-            <a:endParaRPr lang="en-GB"/>
-          </a:p>
-        </p:txBody>
-      </p:sp>
     </p:spTree>
     <p:extLst>
       <p:ext uri="{BB962C8B-B14F-4D97-AF65-F5344CB8AC3E}">
@@ -29829,6 +29757,42 @@
           <a:chExt cx="0" cy="0"/>
         </a:xfrm>
       </p:grpSpPr>
+      <p:pic>
+        <p:nvPicPr>
+          <p:cNvPr id="7" name="Picture 6" descr="A white background with black dots&#10;&#10;Description automatically generated">
+            <a:extLst>
+              <a:ext uri="{FF2B5EF4-FFF2-40B4-BE49-F238E27FC236}">
+                <a16:creationId xmlns:a16="http://schemas.microsoft.com/office/drawing/2014/main" id="{D7F8A629-2A07-8AA0-0B33-059DAFED8860}"/>
+              </a:ext>
+            </a:extLst>
+          </p:cNvPr>
+          <p:cNvPicPr>
+            <a:picLocks noChangeAspect="1"/>
+          </p:cNvPicPr>
+          <p:nvPr/>
+        </p:nvPicPr>
+        <p:blipFill>
+          <a:blip r:embed="rId3">
+            <a:extLst>
+              <a:ext uri="{28A0092B-C50C-407E-A947-70E740481C1C}">
+                <a14:useLocalDpi xmlns:a14="http://schemas.microsoft.com/office/drawing/2010/main" val="0"/>
+              </a:ext>
+            </a:extLst>
+          </a:blip>
+          <a:stretch>
+            <a:fillRect/>
+          </a:stretch>
+        </p:blipFill>
+        <p:spPr>
+          <a:xfrm>
+            <a:off x="7545111" y="2250946"/>
+            <a:ext cx="4096987" cy="716468"/>
+          </a:xfrm>
+          <a:prstGeom prst="rect">
+            <a:avLst/>
+          </a:prstGeom>
+        </p:spPr>
+      </p:pic>
       <p:sp>
         <p:nvSpPr>
           <p:cNvPr id="2" name="Title 1">
@@ -30181,42 +30145,6 @@
           </a:p>
         </p:txBody>
       </p:sp>
-      <p:pic>
-        <p:nvPicPr>
-          <p:cNvPr id="5" name="Picture 4">
-            <a:extLst>
-              <a:ext uri="{FF2B5EF4-FFF2-40B4-BE49-F238E27FC236}">
-                <a16:creationId xmlns:a16="http://schemas.microsoft.com/office/drawing/2014/main" id="{B0DB59A0-7CB8-854F-BCEB-89FD31701A5C}"/>
-              </a:ext>
-            </a:extLst>
-          </p:cNvPr>
-          <p:cNvPicPr>
-            <a:picLocks noChangeAspect="1"/>
-          </p:cNvPicPr>
-          <p:nvPr/>
-        </p:nvPicPr>
-        <p:blipFill>
-          <a:blip r:embed="rId3">
-            <a:extLst>
-              <a:ext uri="{28A0092B-C50C-407E-A947-70E740481C1C}">
-                <a14:useLocalDpi xmlns:a14="http://schemas.microsoft.com/office/drawing/2010/main" val="0"/>
-              </a:ext>
-            </a:extLst>
-          </a:blip>
-          <a:stretch>
-            <a:fillRect/>
-          </a:stretch>
-        </p:blipFill>
-        <p:spPr>
-          <a:xfrm>
-            <a:off x="7436928" y="2251429"/>
-            <a:ext cx="4359558" cy="700388"/>
-          </a:xfrm>
-          <a:prstGeom prst="rect">
-            <a:avLst/>
-          </a:prstGeom>
-        </p:spPr>
-      </p:pic>
       <p:sp>
         <p:nvSpPr>
           <p:cNvPr id="10" name="Rectangle 9">
@@ -31224,14 +31152,6 @@
             </a:r>
             <a:r>
               <a:rPr lang="en-US" dirty="0" err="1"/>
-              <a:t>ThemeData</a:t>
-            </a:r>
-            <a:r>
-              <a:rPr lang="en-US" dirty="0"/>
-              <a:t>, </a:t>
-            </a:r>
-            <a:r>
-              <a:rPr lang="en-US" dirty="0" err="1"/>
               <a:t>AppBar</a:t>
             </a:r>
             <a:r>
@@ -31244,18 +31164,47 @@
             </a:r>
             <a:r>
               <a:rPr lang="en-US" dirty="0"/>
-              <a:t>, Column, Row, and some others…</a:t>
+              <a:t>, Column, Row, Colors, and some others…</a:t>
             </a:r>
             <a:endParaRPr lang="en-GB" dirty="0"/>
+          </a:p>
+        </p:txBody>
+      </p:sp>
+      <p:sp>
+        <p:nvSpPr>
+          <p:cNvPr id="4" name="Slide Number Placeholder 3">
+            <a:extLst>
+              <a:ext uri="{FF2B5EF4-FFF2-40B4-BE49-F238E27FC236}">
+                <a16:creationId xmlns:a16="http://schemas.microsoft.com/office/drawing/2014/main" id="{B5E1AA86-E502-C847-8FDA-5F3696AE2898}"/>
+              </a:ext>
+            </a:extLst>
+          </p:cNvPr>
+          <p:cNvSpPr>
+            <a:spLocks noGrp="1"/>
+          </p:cNvSpPr>
+          <p:nvPr>
+            <p:ph type="sldNum" sz="quarter" idx="12"/>
+          </p:nvPr>
+        </p:nvSpPr>
+        <p:spPr/>
+        <p:txBody>
+          <a:bodyPr/>
+          <a:lstStyle/>
+          <a:p>
+            <a:fld id="{31DE2C5B-556E-47B8-A792-024C2FCA4ACC}" type="slidenum">
+              <a:rPr lang="en-GB" smtClean="0"/>
+              <a:t>46</a:t>
+            </a:fld>
+            <a:endParaRPr lang="en-GB"/>
           </a:p>
         </p:txBody>
       </p:sp>
       <p:pic>
         <p:nvPicPr>
-          <p:cNvPr id="6" name="Picture 5" descr="Text&#10;&#10;Description automatically generated">
+          <p:cNvPr id="7" name="Picture 6" descr="A screenshot of a cell phone&#10;&#10;Description automatically generated">
             <a:extLst>
               <a:ext uri="{FF2B5EF4-FFF2-40B4-BE49-F238E27FC236}">
-                <a16:creationId xmlns:a16="http://schemas.microsoft.com/office/drawing/2014/main" id="{6CEE6640-D15F-944F-B33E-BAC7FFA9C3B2}"/>
+                <a16:creationId xmlns:a16="http://schemas.microsoft.com/office/drawing/2014/main" id="{14B64064-18EE-D6EB-976B-75E0FDCB0F11}"/>
               </a:ext>
             </a:extLst>
           </p:cNvPr>
@@ -31278,43 +31227,14 @@
         </p:blipFill>
         <p:spPr>
           <a:xfrm>
-            <a:off x="9313910" y="1361167"/>
-            <a:ext cx="2363844" cy="5115600"/>
+            <a:off x="8185405" y="445366"/>
+            <a:ext cx="2895630" cy="6276109"/>
           </a:xfrm>
           <a:prstGeom prst="rect">
             <a:avLst/>
           </a:prstGeom>
         </p:spPr>
       </p:pic>
-      <p:sp>
-        <p:nvSpPr>
-          <p:cNvPr id="4" name="Slide Number Placeholder 3">
-            <a:extLst>
-              <a:ext uri="{FF2B5EF4-FFF2-40B4-BE49-F238E27FC236}">
-                <a16:creationId xmlns:a16="http://schemas.microsoft.com/office/drawing/2014/main" id="{B5E1AA86-E502-C847-8FDA-5F3696AE2898}"/>
-              </a:ext>
-            </a:extLst>
-          </p:cNvPr>
-          <p:cNvSpPr>
-            <a:spLocks noGrp="1"/>
-          </p:cNvSpPr>
-          <p:nvPr>
-            <p:ph type="sldNum" sz="quarter" idx="12"/>
-          </p:nvPr>
-        </p:nvSpPr>
-        <p:spPr/>
-        <p:txBody>
-          <a:bodyPr/>
-          <a:lstStyle/>
-          <a:p>
-            <a:fld id="{31DE2C5B-556E-47B8-A792-024C2FCA4ACC}" type="slidenum">
-              <a:rPr lang="en-GB" smtClean="0"/>
-              <a:t>46</a:t>
-            </a:fld>
-            <a:endParaRPr lang="en-GB"/>
-          </a:p>
-        </p:txBody>
-      </p:sp>
     </p:spTree>
     <p:extLst>
       <p:ext uri="{BB962C8B-B14F-4D97-AF65-F5344CB8AC3E}">
@@ -31485,12 +31405,41 @@
           </a:p>
         </p:txBody>
       </p:sp>
+      <p:sp>
+        <p:nvSpPr>
+          <p:cNvPr id="4" name="Slide Number Placeholder 3">
+            <a:extLst>
+              <a:ext uri="{FF2B5EF4-FFF2-40B4-BE49-F238E27FC236}">
+                <a16:creationId xmlns:a16="http://schemas.microsoft.com/office/drawing/2014/main" id="{D98BB973-5833-B045-A0E7-EB9FA50DBB43}"/>
+              </a:ext>
+            </a:extLst>
+          </p:cNvPr>
+          <p:cNvSpPr>
+            <a:spLocks noGrp="1"/>
+          </p:cNvSpPr>
+          <p:nvPr>
+            <p:ph type="sldNum" sz="quarter" idx="12"/>
+          </p:nvPr>
+        </p:nvSpPr>
+        <p:spPr/>
+        <p:txBody>
+          <a:bodyPr/>
+          <a:lstStyle/>
+          <a:p>
+            <a:fld id="{31DE2C5B-556E-47B8-A792-024C2FCA4ACC}" type="slidenum">
+              <a:rPr lang="en-GB" smtClean="0"/>
+              <a:t>47</a:t>
+            </a:fld>
+            <a:endParaRPr lang="en-GB"/>
+          </a:p>
+        </p:txBody>
+      </p:sp>
       <p:pic>
         <p:nvPicPr>
-          <p:cNvPr id="5" name="Picture 4">
+          <p:cNvPr id="7" name="Picture 6" descr="A screenshot of a phone&#10;&#10;Description automatically generated">
             <a:extLst>
               <a:ext uri="{FF2B5EF4-FFF2-40B4-BE49-F238E27FC236}">
-                <a16:creationId xmlns:a16="http://schemas.microsoft.com/office/drawing/2014/main" id="{231B39C3-B037-634F-ABA6-D7462F2D303E}"/>
+                <a16:creationId xmlns:a16="http://schemas.microsoft.com/office/drawing/2014/main" id="{17CE5C8A-62CD-C9F4-98B0-DA495AE47167}"/>
               </a:ext>
             </a:extLst>
           </p:cNvPr>
@@ -31513,43 +31462,14 @@
         </p:blipFill>
         <p:spPr>
           <a:xfrm>
-            <a:off x="8935228" y="1123177"/>
-            <a:ext cx="2575154" cy="5572897"/>
+            <a:off x="8610600" y="607147"/>
+            <a:ext cx="2652530" cy="5749203"/>
           </a:xfrm>
           <a:prstGeom prst="rect">
             <a:avLst/>
           </a:prstGeom>
         </p:spPr>
       </p:pic>
-      <p:sp>
-        <p:nvSpPr>
-          <p:cNvPr id="4" name="Slide Number Placeholder 3">
-            <a:extLst>
-              <a:ext uri="{FF2B5EF4-FFF2-40B4-BE49-F238E27FC236}">
-                <a16:creationId xmlns:a16="http://schemas.microsoft.com/office/drawing/2014/main" id="{D98BB973-5833-B045-A0E7-EB9FA50DBB43}"/>
-              </a:ext>
-            </a:extLst>
-          </p:cNvPr>
-          <p:cNvSpPr>
-            <a:spLocks noGrp="1"/>
-          </p:cNvSpPr>
-          <p:nvPr>
-            <p:ph type="sldNum" sz="quarter" idx="12"/>
-          </p:nvPr>
-        </p:nvSpPr>
-        <p:spPr/>
-        <p:txBody>
-          <a:bodyPr/>
-          <a:lstStyle/>
-          <a:p>
-            <a:fld id="{31DE2C5B-556E-47B8-A792-024C2FCA4ACC}" type="slidenum">
-              <a:rPr lang="en-GB" smtClean="0"/>
-              <a:t>47</a:t>
-            </a:fld>
-            <a:endParaRPr lang="en-GB"/>
-          </a:p>
-        </p:txBody>
-      </p:sp>
     </p:spTree>
     <p:extLst>
       <p:ext uri="{BB962C8B-B14F-4D97-AF65-F5344CB8AC3E}">
@@ -31697,12 +31617,41 @@
           </a:p>
         </p:txBody>
       </p:sp>
+      <p:sp>
+        <p:nvSpPr>
+          <p:cNvPr id="4" name="Slide Number Placeholder 3">
+            <a:extLst>
+              <a:ext uri="{FF2B5EF4-FFF2-40B4-BE49-F238E27FC236}">
+                <a16:creationId xmlns:a16="http://schemas.microsoft.com/office/drawing/2014/main" id="{D4AE98F8-E068-B648-9420-A83412812A2F}"/>
+              </a:ext>
+            </a:extLst>
+          </p:cNvPr>
+          <p:cNvSpPr>
+            <a:spLocks noGrp="1"/>
+          </p:cNvSpPr>
+          <p:nvPr>
+            <p:ph type="sldNum" sz="quarter" idx="12"/>
+          </p:nvPr>
+        </p:nvSpPr>
+        <p:spPr/>
+        <p:txBody>
+          <a:bodyPr/>
+          <a:lstStyle/>
+          <a:p>
+            <a:fld id="{31DE2C5B-556E-47B8-A792-024C2FCA4ACC}" type="slidenum">
+              <a:rPr lang="en-GB" smtClean="0"/>
+              <a:t>48</a:t>
+            </a:fld>
+            <a:endParaRPr lang="en-GB"/>
+          </a:p>
+        </p:txBody>
+      </p:sp>
       <p:pic>
         <p:nvPicPr>
-          <p:cNvPr id="9" name="Picture 8" descr="A picture containing chart&#10;&#10;Description automatically generated">
+          <p:cNvPr id="6" name="Picture 5" descr="A screenshot of a phone&#10;&#10;Description automatically generated">
             <a:extLst>
               <a:ext uri="{FF2B5EF4-FFF2-40B4-BE49-F238E27FC236}">
-                <a16:creationId xmlns:a16="http://schemas.microsoft.com/office/drawing/2014/main" id="{5C293901-4EE9-624E-B81C-BD5C0A061CFA}"/>
+                <a16:creationId xmlns:a16="http://schemas.microsoft.com/office/drawing/2014/main" id="{BA827384-EC48-9507-B9C7-84A8CB3356F1}"/>
               </a:ext>
             </a:extLst>
           </p:cNvPr>
@@ -31725,43 +31674,14 @@
         </p:blipFill>
         <p:spPr>
           <a:xfrm>
-            <a:off x="8896310" y="1299892"/>
-            <a:ext cx="2465182" cy="5334907"/>
+            <a:off x="8711878" y="592047"/>
+            <a:ext cx="2599082" cy="5633358"/>
           </a:xfrm>
           <a:prstGeom prst="rect">
             <a:avLst/>
           </a:prstGeom>
         </p:spPr>
       </p:pic>
-      <p:sp>
-        <p:nvSpPr>
-          <p:cNvPr id="4" name="Slide Number Placeholder 3">
-            <a:extLst>
-              <a:ext uri="{FF2B5EF4-FFF2-40B4-BE49-F238E27FC236}">
-                <a16:creationId xmlns:a16="http://schemas.microsoft.com/office/drawing/2014/main" id="{D4AE98F8-E068-B648-9420-A83412812A2F}"/>
-              </a:ext>
-            </a:extLst>
-          </p:cNvPr>
-          <p:cNvSpPr>
-            <a:spLocks noGrp="1"/>
-          </p:cNvSpPr>
-          <p:nvPr>
-            <p:ph type="sldNum" sz="quarter" idx="12"/>
-          </p:nvPr>
-        </p:nvSpPr>
-        <p:spPr/>
-        <p:txBody>
-          <a:bodyPr/>
-          <a:lstStyle/>
-          <a:p>
-            <a:fld id="{31DE2C5B-556E-47B8-A792-024C2FCA4ACC}" type="slidenum">
-              <a:rPr lang="en-GB" smtClean="0"/>
-              <a:t>48</a:t>
-            </a:fld>
-            <a:endParaRPr lang="en-GB"/>
-          </a:p>
-        </p:txBody>
-      </p:sp>
     </p:spTree>
     <p:extLst>
       <p:ext uri="{BB962C8B-B14F-4D97-AF65-F5344CB8AC3E}">
@@ -31957,42 +31877,6 @@
           </a:p>
         </p:txBody>
       </p:sp>
-      <p:pic>
-        <p:nvPicPr>
-          <p:cNvPr id="6" name="Picture 5" descr="Background pattern&#10;&#10;Description automatically generated with low confidence">
-            <a:extLst>
-              <a:ext uri="{FF2B5EF4-FFF2-40B4-BE49-F238E27FC236}">
-                <a16:creationId xmlns:a16="http://schemas.microsoft.com/office/drawing/2014/main" id="{BDC19473-58B9-9D43-90CD-B598F0AC535A}"/>
-              </a:ext>
-            </a:extLst>
-          </p:cNvPr>
-          <p:cNvPicPr>
-            <a:picLocks noChangeAspect="1"/>
-          </p:cNvPicPr>
-          <p:nvPr/>
-        </p:nvPicPr>
-        <p:blipFill>
-          <a:blip r:embed="rId2">
-            <a:extLst>
-              <a:ext uri="{28A0092B-C50C-407E-A947-70E740481C1C}">
-                <a14:useLocalDpi xmlns:a14="http://schemas.microsoft.com/office/drawing/2010/main" val="0"/>
-              </a:ext>
-            </a:extLst>
-          </a:blip>
-          <a:stretch>
-            <a:fillRect/>
-          </a:stretch>
-        </p:blipFill>
-        <p:spPr>
-          <a:xfrm>
-            <a:off x="9220310" y="1348567"/>
-            <a:ext cx="2340554" cy="5065200"/>
-          </a:xfrm>
-          <a:prstGeom prst="rect">
-            <a:avLst/>
-          </a:prstGeom>
-        </p:spPr>
-      </p:pic>
       <p:sp>
         <p:nvSpPr>
           <p:cNvPr id="4" name="Slide Number Placeholder 3">
@@ -32022,6 +31906,44 @@
           </a:p>
         </p:txBody>
       </p:sp>
+      <p:pic>
+        <p:nvPicPr>
+          <p:cNvPr id="5" name="Simulator Screen Recording - iPhone 15 Pro Max - 2024-02-06 at 13.34.59">
+            <a:hlinkClick r:id="" action="ppaction://media"/>
+            <a:extLst>
+              <a:ext uri="{FF2B5EF4-FFF2-40B4-BE49-F238E27FC236}">
+                <a16:creationId xmlns:a16="http://schemas.microsoft.com/office/drawing/2014/main" id="{CBDEA95F-1029-2170-2230-273BDACAB0A6}"/>
+              </a:ext>
+            </a:extLst>
+          </p:cNvPr>
+          <p:cNvPicPr>
+            <a:picLocks noChangeAspect="1"/>
+          </p:cNvPicPr>
+          <p:nvPr>
+            <a:videoFile r:link="rId2"/>
+            <p:extLst>
+              <p:ext uri="{DAA4B4D4-6D71-4841-9C94-3DE7FCFB9230}">
+                <p14:media xmlns:p14="http://schemas.microsoft.com/office/powerpoint/2010/main" r:embed="rId1"/>
+              </p:ext>
+            </p:extLst>
+          </p:nvPr>
+        </p:nvPicPr>
+        <p:blipFill>
+          <a:blip r:embed="rId4"/>
+          <a:stretch>
+            <a:fillRect/>
+          </a:stretch>
+        </p:blipFill>
+        <p:spPr>
+          <a:xfrm>
+            <a:off x="8285018" y="341870"/>
+            <a:ext cx="2858959" cy="6197042"/>
+          </a:xfrm>
+          <a:prstGeom prst="rect">
+            <a:avLst/>
+          </a:prstGeom>
+        </p:spPr>
+      </p:pic>
     </p:spTree>
     <p:extLst>
       <p:ext uri="{BB962C8B-B14F-4D97-AF65-F5344CB8AC3E}">
@@ -32032,6 +31954,141 @@
   <p:clrMapOvr>
     <a:masterClrMapping/>
   </p:clrMapOvr>
+  <p:timing>
+    <p:tnLst>
+      <p:par>
+        <p:cTn id="1" dur="indefinite" restart="never" nodeType="tmRoot">
+          <p:childTnLst>
+            <p:seq concurrent="1" nextAc="seek">
+              <p:cTn id="2" dur="indefinite" nodeType="mainSeq">
+                <p:childTnLst>
+                  <p:par>
+                    <p:cTn id="3" fill="hold">
+                      <p:stCondLst>
+                        <p:cond delay="indefinite"/>
+                      </p:stCondLst>
+                      <p:childTnLst>
+                        <p:par>
+                          <p:cTn id="4" fill="hold">
+                            <p:stCondLst>
+                              <p:cond delay="0"/>
+                            </p:stCondLst>
+                            <p:childTnLst>
+                              <p:par>
+                                <p:cTn id="5" presetID="1" presetClass="mediacall" presetSubtype="0" fill="hold" nodeType="clickEffect">
+                                  <p:stCondLst>
+                                    <p:cond delay="0"/>
+                                  </p:stCondLst>
+                                  <p:childTnLst>
+                                    <p:cmd type="call" cmd="playFrom(0.0)">
+                                      <p:cBhvr>
+                                        <p:cTn id="6" dur="7250" fill="hold"/>
+                                        <p:tgtEl>
+                                          <p:spTgt spid="5"/>
+                                        </p:tgtEl>
+                                      </p:cBhvr>
+                                    </p:cmd>
+                                  </p:childTnLst>
+                                </p:cTn>
+                              </p:par>
+                            </p:childTnLst>
+                          </p:cTn>
+                        </p:par>
+                      </p:childTnLst>
+                    </p:cTn>
+                  </p:par>
+                </p:childTnLst>
+              </p:cTn>
+              <p:prevCondLst>
+                <p:cond evt="onPrev" delay="0">
+                  <p:tgtEl>
+                    <p:sldTgt/>
+                  </p:tgtEl>
+                </p:cond>
+              </p:prevCondLst>
+              <p:nextCondLst>
+                <p:cond evt="onNext" delay="0">
+                  <p:tgtEl>
+                    <p:sldTgt/>
+                  </p:tgtEl>
+                </p:cond>
+              </p:nextCondLst>
+            </p:seq>
+            <p:video>
+              <p:cMediaNode vol="80000">
+                <p:cTn id="7" fill="hold" display="0">
+                  <p:stCondLst>
+                    <p:cond delay="indefinite"/>
+                  </p:stCondLst>
+                </p:cTn>
+                <p:tgtEl>
+                  <p:spTgt spid="5"/>
+                </p:tgtEl>
+              </p:cMediaNode>
+            </p:video>
+            <p:seq concurrent="1" nextAc="seek">
+              <p:cTn id="8" restart="whenNotActive" fill="hold" evtFilter="cancelBubble" nodeType="interactiveSeq">
+                <p:stCondLst>
+                  <p:cond evt="onClick" delay="0">
+                    <p:tgtEl>
+                      <p:spTgt spid="5"/>
+                    </p:tgtEl>
+                  </p:cond>
+                </p:stCondLst>
+                <p:endSync evt="end" delay="0">
+                  <p:rtn val="all"/>
+                </p:endSync>
+                <p:childTnLst>
+                  <p:par>
+                    <p:cTn id="9" fill="hold">
+                      <p:stCondLst>
+                        <p:cond delay="0"/>
+                      </p:stCondLst>
+                      <p:childTnLst>
+                        <p:par>
+                          <p:cTn id="10" fill="hold">
+                            <p:stCondLst>
+                              <p:cond delay="0"/>
+                            </p:stCondLst>
+                            <p:childTnLst>
+                              <p:par>
+                                <p:cTn id="11" presetID="2" presetClass="mediacall" presetSubtype="0" fill="hold" nodeType="clickEffect">
+                                  <p:stCondLst>
+                                    <p:cond delay="0"/>
+                                  </p:stCondLst>
+                                  <p:childTnLst>
+                                    <p:cmd type="call" cmd="togglePause">
+                                      <p:cBhvr>
+                                        <p:cTn id="12" dur="1" fill="hold"/>
+                                        <p:tgtEl>
+                                          <p:spTgt spid="5"/>
+                                        </p:tgtEl>
+                                      </p:cBhvr>
+                                    </p:cmd>
+                                  </p:childTnLst>
+                                </p:cTn>
+                              </p:par>
+                            </p:childTnLst>
+                          </p:cTn>
+                        </p:par>
+                      </p:childTnLst>
+                    </p:cTn>
+                  </p:par>
+                </p:childTnLst>
+              </p:cTn>
+              <p:nextCondLst>
+                <p:cond evt="onClick" delay="0">
+                  <p:tgtEl>
+                    <p:spTgt spid="5"/>
+                  </p:tgtEl>
+                </p:cond>
+              </p:nextCondLst>
+            </p:seq>
+          </p:childTnLst>
+        </p:cTn>
+      </p:par>
+    </p:tnLst>
+  </p:timing>
 </p:sld>
 </file>
 
@@ -32811,12 +32868,41 @@
           </a:p>
         </p:txBody>
       </p:sp>
+      <p:sp>
+        <p:nvSpPr>
+          <p:cNvPr id="4" name="Slide Number Placeholder 3">
+            <a:extLst>
+              <a:ext uri="{FF2B5EF4-FFF2-40B4-BE49-F238E27FC236}">
+                <a16:creationId xmlns:a16="http://schemas.microsoft.com/office/drawing/2014/main" id="{CEDEFB6C-D5FB-A245-89DB-26FEB892F2D4}"/>
+              </a:ext>
+            </a:extLst>
+          </p:cNvPr>
+          <p:cNvSpPr>
+            <a:spLocks noGrp="1"/>
+          </p:cNvSpPr>
+          <p:nvPr>
+            <p:ph type="sldNum" sz="quarter" idx="12"/>
+          </p:nvPr>
+        </p:nvSpPr>
+        <p:spPr/>
+        <p:txBody>
+          <a:bodyPr/>
+          <a:lstStyle/>
+          <a:p>
+            <a:fld id="{31DE2C5B-556E-47B8-A792-024C2FCA4ACC}" type="slidenum">
+              <a:rPr lang="en-GB" smtClean="0"/>
+              <a:t>50</a:t>
+            </a:fld>
+            <a:endParaRPr lang="en-GB"/>
+          </a:p>
+        </p:txBody>
+      </p:sp>
       <p:pic>
         <p:nvPicPr>
-          <p:cNvPr id="6" name="Picture 5" descr="Chart&#10;&#10;Description automatically generated with low confidence">
+          <p:cNvPr id="7" name="Picture 6" descr="A screenshot of a phone&#10;&#10;Description automatically generated">
             <a:extLst>
               <a:ext uri="{FF2B5EF4-FFF2-40B4-BE49-F238E27FC236}">
-                <a16:creationId xmlns:a16="http://schemas.microsoft.com/office/drawing/2014/main" id="{3389E95C-4C28-674B-8F38-F5E44A1482C3}"/>
+                <a16:creationId xmlns:a16="http://schemas.microsoft.com/office/drawing/2014/main" id="{757064D4-CD2F-089B-99EC-1A3918CB1D43}"/>
               </a:ext>
             </a:extLst>
           </p:cNvPr>
@@ -32839,43 +32925,14 @@
         </p:blipFill>
         <p:spPr>
           <a:xfrm>
-            <a:off x="9341737" y="1205947"/>
-            <a:ext cx="2422091" cy="5241653"/>
+            <a:off x="8046859" y="1280203"/>
+            <a:ext cx="2536093" cy="5496833"/>
           </a:xfrm>
           <a:prstGeom prst="rect">
             <a:avLst/>
           </a:prstGeom>
         </p:spPr>
       </p:pic>
-      <p:sp>
-        <p:nvSpPr>
-          <p:cNvPr id="4" name="Slide Number Placeholder 3">
-            <a:extLst>
-              <a:ext uri="{FF2B5EF4-FFF2-40B4-BE49-F238E27FC236}">
-                <a16:creationId xmlns:a16="http://schemas.microsoft.com/office/drawing/2014/main" id="{CEDEFB6C-D5FB-A245-89DB-26FEB892F2D4}"/>
-              </a:ext>
-            </a:extLst>
-          </p:cNvPr>
-          <p:cNvSpPr>
-            <a:spLocks noGrp="1"/>
-          </p:cNvSpPr>
-          <p:nvPr>
-            <p:ph type="sldNum" sz="quarter" idx="12"/>
-          </p:nvPr>
-        </p:nvSpPr>
-        <p:spPr/>
-        <p:txBody>
-          <a:bodyPr/>
-          <a:lstStyle/>
-          <a:p>
-            <a:fld id="{31DE2C5B-556E-47B8-A792-024C2FCA4ACC}" type="slidenum">
-              <a:rPr lang="en-GB" smtClean="0"/>
-              <a:t>50</a:t>
-            </a:fld>
-            <a:endParaRPr lang="en-GB"/>
-          </a:p>
-        </p:txBody>
-      </p:sp>
     </p:spTree>
     <p:extLst>
       <p:ext uri="{BB962C8B-B14F-4D97-AF65-F5344CB8AC3E}">
@@ -33600,20 +33657,46 @@
         </p:spPr>
         <p:txBody>
           <a:bodyPr>
-            <a:normAutofit lnSpcReduction="10000"/>
+            <a:normAutofit fontScale="92500" lnSpcReduction="20000"/>
           </a:bodyPr>
           <a:lstStyle/>
           <a:p>
             <a:r>
+              <a:rPr lang="en-GB" dirty="0"/>
+              <a:t>Code repository of today’s lesson and exercises solution</a:t>
+            </a:r>
+          </a:p>
+          <a:p>
+            <a:pPr lvl="1"/>
+            <a:r>
+              <a:rPr lang="en-GB" dirty="0">
+                <a:hlinkClick r:id="rId2"/>
+              </a:rPr>
+              <a:t>https://github.com/gcappon/bwthw/tree/master/lab_05-understanding_ui</a:t>
+            </a:r>
+            <a:r>
+              <a:rPr lang="en-GB" dirty="0"/>
+              <a:t>  </a:t>
+            </a:r>
+          </a:p>
+          <a:p>
+            <a:endParaRPr lang="en-US" dirty="0"/>
+          </a:p>
+          <a:p>
+            <a:r>
+              <a:rPr lang="en-IT"/>
+              <a:t>Material </a:t>
+            </a:r>
+            <a:r>
               <a:rPr lang="en-IT" dirty="0"/>
-              <a:t>Material Widgets for UI </a:t>
+              <a:t>Widgets for UI </a:t>
             </a:r>
           </a:p>
           <a:p>
             <a:pPr lvl="1"/>
             <a:r>
               <a:rPr lang="en-GB" dirty="0">
-                <a:hlinkClick r:id="rId2"/>
+                <a:hlinkClick r:id="rId3"/>
               </a:rPr>
               <a:t>https://docs.flutter.dev/development/ui/widgets/material</a:t>
             </a:r>
@@ -33633,7 +33716,7 @@
             <a:pPr lvl="1"/>
             <a:r>
               <a:rPr lang="en-GB" dirty="0">
-                <a:hlinkClick r:id="rId3"/>
+                <a:hlinkClick r:id="rId4"/>
               </a:rPr>
               <a:t>https://docs.flutter.dev/development/ui/widgets</a:t>
             </a:r>
@@ -33661,7 +33744,7 @@
             <a:pPr lvl="1"/>
             <a:r>
               <a:rPr lang="en-GB" dirty="0">
-                <a:hlinkClick r:id="rId4"/>
+                <a:hlinkClick r:id="rId5"/>
               </a:rPr>
               <a:t>https://docs.flutter.dev/reference/widgets</a:t>
             </a:r>
@@ -33681,7 +33764,7 @@
             <a:pPr lvl="1"/>
             <a:r>
               <a:rPr lang="en-GB" dirty="0">
-                <a:hlinkClick r:id="rId5"/>
+                <a:hlinkClick r:id="rId6"/>
               </a:rPr>
               <a:t>https://docs.flutter.dev/development/ui/layout/constraints</a:t>
             </a:r>
@@ -33700,7 +33783,7 @@
             <a:pPr lvl="1"/>
             <a:r>
               <a:rPr lang="en-GB" dirty="0">
-                <a:hlinkClick r:id="rId6"/>
+                <a:hlinkClick r:id="rId7"/>
               </a:rPr>
               <a:t>https://docs.flutter.dev/development/ui/layout</a:t>
             </a:r>

</xml_diff>